<commit_message>
Update documents. See NEWS.md for more information.
</commit_message>
<xml_diff>
--- a/Manuscript/For Manuscript.pptx
+++ b/Manuscript/For Manuscript.pptx
@@ -5,20 +5,19 @@
     <p:sldMasterId id="2147483648" r:id="rId1"/>
   </p:sldMasterIdLst>
   <p:sldIdLst>
-    <p:sldId id="261" r:id="rId2"/>
-    <p:sldId id="271" r:id="rId3"/>
-    <p:sldId id="257" r:id="rId4"/>
-    <p:sldId id="266" r:id="rId5"/>
-    <p:sldId id="258" r:id="rId6"/>
-    <p:sldId id="259" r:id="rId7"/>
-    <p:sldId id="260" r:id="rId8"/>
-    <p:sldId id="264" r:id="rId9"/>
-    <p:sldId id="270" r:id="rId10"/>
-    <p:sldId id="269" r:id="rId11"/>
-    <p:sldId id="267" r:id="rId12"/>
-    <p:sldId id="268" r:id="rId13"/>
-    <p:sldId id="265" r:id="rId14"/>
-    <p:sldId id="263" r:id="rId15"/>
+    <p:sldId id="271" r:id="rId2"/>
+    <p:sldId id="257" r:id="rId3"/>
+    <p:sldId id="266" r:id="rId4"/>
+    <p:sldId id="258" r:id="rId5"/>
+    <p:sldId id="259" r:id="rId6"/>
+    <p:sldId id="260" r:id="rId7"/>
+    <p:sldId id="264" r:id="rId8"/>
+    <p:sldId id="270" r:id="rId9"/>
+    <p:sldId id="269" r:id="rId10"/>
+    <p:sldId id="267" r:id="rId11"/>
+    <p:sldId id="268" r:id="rId12"/>
+    <p:sldId id="265" r:id="rId13"/>
+    <p:sldId id="263" r:id="rId14"/>
   </p:sldIdLst>
   <p:sldSz cx="12192000" cy="6858000"/>
   <p:notesSz cx="6858000" cy="9144000"/>
@@ -274,7 +273,7 @@
           <a:p>
             <a:fld id="{EB10F2E8-62C3-4AB7-A3E9-63CBF2EFDED7}" type="datetimeFigureOut">
               <a:rPr lang="en-SG" smtClean="0"/>
-              <a:t>4/1/2023</a:t>
+              <a:t>22/1/2023</a:t>
             </a:fld>
             <a:endParaRPr lang="en-SG"/>
           </a:p>
@@ -474,7 +473,7 @@
           <a:p>
             <a:fld id="{EB10F2E8-62C3-4AB7-A3E9-63CBF2EFDED7}" type="datetimeFigureOut">
               <a:rPr lang="en-SG" smtClean="0"/>
-              <a:t>4/1/2023</a:t>
+              <a:t>22/1/2023</a:t>
             </a:fld>
             <a:endParaRPr lang="en-SG"/>
           </a:p>
@@ -684,7 +683,7 @@
           <a:p>
             <a:fld id="{EB10F2E8-62C3-4AB7-A3E9-63CBF2EFDED7}" type="datetimeFigureOut">
               <a:rPr lang="en-SG" smtClean="0"/>
-              <a:t>4/1/2023</a:t>
+              <a:t>22/1/2023</a:t>
             </a:fld>
             <a:endParaRPr lang="en-SG"/>
           </a:p>
@@ -884,7 +883,7 @@
           <a:p>
             <a:fld id="{EB10F2E8-62C3-4AB7-A3E9-63CBF2EFDED7}" type="datetimeFigureOut">
               <a:rPr lang="en-SG" smtClean="0"/>
-              <a:t>4/1/2023</a:t>
+              <a:t>22/1/2023</a:t>
             </a:fld>
             <a:endParaRPr lang="en-SG"/>
           </a:p>
@@ -1160,7 +1159,7 @@
           <a:p>
             <a:fld id="{EB10F2E8-62C3-4AB7-A3E9-63CBF2EFDED7}" type="datetimeFigureOut">
               <a:rPr lang="en-SG" smtClean="0"/>
-              <a:t>4/1/2023</a:t>
+              <a:t>22/1/2023</a:t>
             </a:fld>
             <a:endParaRPr lang="en-SG"/>
           </a:p>
@@ -1428,7 +1427,7 @@
           <a:p>
             <a:fld id="{EB10F2E8-62C3-4AB7-A3E9-63CBF2EFDED7}" type="datetimeFigureOut">
               <a:rPr lang="en-SG" smtClean="0"/>
-              <a:t>4/1/2023</a:t>
+              <a:t>22/1/2023</a:t>
             </a:fld>
             <a:endParaRPr lang="en-SG"/>
           </a:p>
@@ -1843,7 +1842,7 @@
           <a:p>
             <a:fld id="{EB10F2E8-62C3-4AB7-A3E9-63CBF2EFDED7}" type="datetimeFigureOut">
               <a:rPr lang="en-SG" smtClean="0"/>
-              <a:t>4/1/2023</a:t>
+              <a:t>22/1/2023</a:t>
             </a:fld>
             <a:endParaRPr lang="en-SG"/>
           </a:p>
@@ -1985,7 +1984,7 @@
           <a:p>
             <a:fld id="{EB10F2E8-62C3-4AB7-A3E9-63CBF2EFDED7}" type="datetimeFigureOut">
               <a:rPr lang="en-SG" smtClean="0"/>
-              <a:t>4/1/2023</a:t>
+              <a:t>22/1/2023</a:t>
             </a:fld>
             <a:endParaRPr lang="en-SG"/>
           </a:p>
@@ -2098,7 +2097,7 @@
           <a:p>
             <a:fld id="{EB10F2E8-62C3-4AB7-A3E9-63CBF2EFDED7}" type="datetimeFigureOut">
               <a:rPr lang="en-SG" smtClean="0"/>
-              <a:t>4/1/2023</a:t>
+              <a:t>22/1/2023</a:t>
             </a:fld>
             <a:endParaRPr lang="en-SG"/>
           </a:p>
@@ -2411,7 +2410,7 @@
           <a:p>
             <a:fld id="{EB10F2E8-62C3-4AB7-A3E9-63CBF2EFDED7}" type="datetimeFigureOut">
               <a:rPr lang="en-SG" smtClean="0"/>
-              <a:t>4/1/2023</a:t>
+              <a:t>22/1/2023</a:t>
             </a:fld>
             <a:endParaRPr lang="en-SG"/>
           </a:p>
@@ -2700,7 +2699,7 @@
           <a:p>
             <a:fld id="{EB10F2E8-62C3-4AB7-A3E9-63CBF2EFDED7}" type="datetimeFigureOut">
               <a:rPr lang="en-SG" smtClean="0"/>
-              <a:t>4/1/2023</a:t>
+              <a:t>22/1/2023</a:t>
             </a:fld>
             <a:endParaRPr lang="en-SG"/>
           </a:p>
@@ -2943,7 +2942,7 @@
           <a:p>
             <a:fld id="{EB10F2E8-62C3-4AB7-A3E9-63CBF2EFDED7}" type="datetimeFigureOut">
               <a:rPr lang="en-SG" smtClean="0"/>
-              <a:t>4/1/2023</a:t>
+              <a:t>22/1/2023</a:t>
             </a:fld>
             <a:endParaRPr lang="en-SG"/>
           </a:p>
@@ -3362,10 +3361,10 @@
       </p:grpSpPr>
       <p:grpSp>
         <p:nvGrpSpPr>
-          <p:cNvPr id="11" name="Group 10">
+          <p:cNvPr id="13" name="Group 12">
             <a:extLst>
               <a:ext uri="{FF2B5EF4-FFF2-40B4-BE49-F238E27FC236}">
-                <a16:creationId xmlns:a16="http://schemas.microsoft.com/office/drawing/2014/main" id="{9BB8214A-BB87-49DC-AC69-D0122C0EC5AC}"/>
+                <a16:creationId xmlns:a16="http://schemas.microsoft.com/office/drawing/2014/main" id="{DB0DBFF1-FA6D-4BF3-A73A-F754FB19EBE1}"/>
               </a:ext>
             </a:extLst>
           </p:cNvPr>
@@ -3374,18 +3373,18 @@
         </p:nvGrpSpPr>
         <p:grpSpPr>
           <a:xfrm>
-            <a:off x="545632" y="-927770"/>
-            <a:ext cx="10591714" cy="9095640"/>
-            <a:chOff x="589175" y="204345"/>
-            <a:chExt cx="10591714" cy="9095640"/>
+            <a:off x="1602272" y="-193361"/>
+            <a:ext cx="9829800" cy="9619079"/>
+            <a:chOff x="1602272" y="-193361"/>
+            <a:chExt cx="9829800" cy="9619079"/>
           </a:xfrm>
         </p:grpSpPr>
         <p:pic>
           <p:nvPicPr>
-            <p:cNvPr id="5" name="Picture 4">
+            <p:cNvPr id="7" name="Picture 6">
               <a:extLst>
                 <a:ext uri="{FF2B5EF4-FFF2-40B4-BE49-F238E27FC236}">
-                  <a16:creationId xmlns:a16="http://schemas.microsoft.com/office/drawing/2014/main" id="{C70D97BE-310D-4D09-A29D-A73C06FE0B9B}"/>
+                  <a16:creationId xmlns:a16="http://schemas.microsoft.com/office/drawing/2014/main" id="{0B99FDAC-32F2-44B5-9893-A1F197513180}"/>
                 </a:ext>
               </a:extLst>
             </p:cNvPr>
@@ -3402,38 +3401,8 @@
           </p:blipFill>
           <p:spPr>
             <a:xfrm>
-              <a:off x="589175" y="204345"/>
-              <a:ext cx="10591714" cy="2199489"/>
-            </a:xfrm>
-            <a:prstGeom prst="rect">
-              <a:avLst/>
-            </a:prstGeom>
-          </p:spPr>
-        </p:pic>
-        <p:pic>
-          <p:nvPicPr>
-            <p:cNvPr id="6" name="Picture 5">
-              <a:extLst>
-                <a:ext uri="{FF2B5EF4-FFF2-40B4-BE49-F238E27FC236}">
-                  <a16:creationId xmlns:a16="http://schemas.microsoft.com/office/drawing/2014/main" id="{9382E6A7-9664-491F-8845-7A6B66C3AED0}"/>
-                </a:ext>
-              </a:extLst>
-            </p:cNvPr>
-            <p:cNvPicPr>
-              <a:picLocks noChangeAspect="1"/>
-            </p:cNvPicPr>
-            <p:nvPr/>
-          </p:nvPicPr>
-          <p:blipFill>
-            <a:blip r:embed="rId3"/>
-            <a:stretch>
-              <a:fillRect/>
-            </a:stretch>
-          </p:blipFill>
-          <p:spPr>
-            <a:xfrm>
-              <a:off x="589175" y="3052134"/>
-              <a:ext cx="10591714" cy="6247851"/>
+              <a:off x="1602272" y="-193361"/>
+              <a:ext cx="9829800" cy="2095500"/>
             </a:xfrm>
             <a:prstGeom prst="rect">
               <a:avLst/>
@@ -3442,10 +3411,10 @@
         </p:pic>
         <p:sp>
           <p:nvSpPr>
-            <p:cNvPr id="7" name="Rectangle 6">
+            <p:cNvPr id="5" name="Rectangle 4">
               <a:extLst>
                 <a:ext uri="{FF2B5EF4-FFF2-40B4-BE49-F238E27FC236}">
-                  <a16:creationId xmlns:a16="http://schemas.microsoft.com/office/drawing/2014/main" id="{3DDFE330-DC5C-4F4A-941F-34FC283131AF}"/>
+                  <a16:creationId xmlns:a16="http://schemas.microsoft.com/office/drawing/2014/main" id="{62F12C4C-3986-49B3-A822-19E8DB481CF4}"/>
                 </a:ext>
               </a:extLst>
             </p:cNvPr>
@@ -3454,7 +3423,7 @@
           </p:nvSpPr>
           <p:spPr>
             <a:xfrm>
-              <a:off x="589175" y="1946763"/>
+              <a:off x="1602272" y="1373448"/>
               <a:ext cx="1504270" cy="378733"/>
             </a:xfrm>
             <a:prstGeom prst="rect">
@@ -3494,24 +3463,24 @@
         </p:sp>
         <p:cxnSp>
           <p:nvCxnSpPr>
-            <p:cNvPr id="8" name="Connector: Elbow 7">
+            <p:cNvPr id="6" name="Connector: Elbow 5">
               <a:extLst>
                 <a:ext uri="{FF2B5EF4-FFF2-40B4-BE49-F238E27FC236}">
-                  <a16:creationId xmlns:a16="http://schemas.microsoft.com/office/drawing/2014/main" id="{E28BCA30-971A-4C16-8AE9-B4881F86A705}"/>
+                  <a16:creationId xmlns:a16="http://schemas.microsoft.com/office/drawing/2014/main" id="{90721847-3904-47B7-B6C2-E6D633C9CFD0}"/>
                 </a:ext>
               </a:extLst>
             </p:cNvPr>
             <p:cNvCxnSpPr>
               <a:cxnSpLocks/>
-              <a:stCxn id="7" idx="2"/>
-              <a:endCxn id="6" idx="0"/>
+              <a:stCxn id="5" idx="2"/>
+              <a:endCxn id="9" idx="0"/>
             </p:cNvCxnSpPr>
             <p:nvPr/>
           </p:nvCxnSpPr>
           <p:spPr>
             <a:xfrm rot="16200000" flipH="1">
-              <a:off x="3249852" y="416954"/>
-              <a:ext cx="726638" cy="4543722"/>
+              <a:off x="4028021" y="78566"/>
+              <a:ext cx="815537" cy="4162765"/>
             </a:xfrm>
             <a:prstGeom prst="bentConnector3">
               <a:avLst>
@@ -3540,11 +3509,41 @@
             </a:fontRef>
           </p:style>
         </p:cxnSp>
+        <p:pic>
+          <p:nvPicPr>
+            <p:cNvPr id="9" name="Picture 8">
+              <a:extLst>
+                <a:ext uri="{FF2B5EF4-FFF2-40B4-BE49-F238E27FC236}">
+                  <a16:creationId xmlns:a16="http://schemas.microsoft.com/office/drawing/2014/main" id="{53A2AA47-3DAB-44B4-B959-95729D73C62F}"/>
+                </a:ext>
+              </a:extLst>
+            </p:cNvPr>
+            <p:cNvPicPr>
+              <a:picLocks noChangeAspect="1"/>
+            </p:cNvPicPr>
+            <p:nvPr/>
+          </p:nvPicPr>
+          <p:blipFill>
+            <a:blip r:embed="rId3"/>
+            <a:stretch>
+              <a:fillRect/>
+            </a:stretch>
+          </p:blipFill>
+          <p:spPr>
+            <a:xfrm>
+              <a:off x="1715149" y="2567718"/>
+              <a:ext cx="9604046" cy="6858000"/>
+            </a:xfrm>
+            <a:prstGeom prst="rect">
+              <a:avLst/>
+            </a:prstGeom>
+          </p:spPr>
+        </p:pic>
       </p:grpSp>
     </p:spTree>
     <p:extLst>
       <p:ext uri="{BB962C8B-B14F-4D97-AF65-F5344CB8AC3E}">
-        <p14:creationId xmlns:p14="http://schemas.microsoft.com/office/powerpoint/2010/main" val="189009480"/>
+        <p14:creationId xmlns:p14="http://schemas.microsoft.com/office/powerpoint/2010/main" val="1076340213"/>
       </p:ext>
     </p:extLst>
   </p:cSld>
@@ -3555,1904 +3554,6 @@
 </file>
 
 <file path=ppt/slides/slide10.xml><?xml version="1.0" encoding="utf-8"?>
-<p:sld xmlns:a="http://schemas.openxmlformats.org/drawingml/2006/main" xmlns:r="http://schemas.openxmlformats.org/officeDocument/2006/relationships" xmlns:p="http://schemas.openxmlformats.org/presentationml/2006/main">
-  <p:cSld>
-    <p:spTree>
-      <p:nvGrpSpPr>
-        <p:cNvPr id="1" name=""/>
-        <p:cNvGrpSpPr/>
-        <p:nvPr/>
-      </p:nvGrpSpPr>
-      <p:grpSpPr>
-        <a:xfrm>
-          <a:off x="0" y="0"/>
-          <a:ext cx="0" cy="0"/>
-          <a:chOff x="0" y="0"/>
-          <a:chExt cx="0" cy="0"/>
-        </a:xfrm>
-      </p:grpSpPr>
-      <p:grpSp>
-        <p:nvGrpSpPr>
-          <p:cNvPr id="59" name="Group 58">
-            <a:extLst>
-              <a:ext uri="{FF2B5EF4-FFF2-40B4-BE49-F238E27FC236}">
-                <a16:creationId xmlns:a16="http://schemas.microsoft.com/office/drawing/2014/main" id="{1289F77F-F4C8-40F5-B1FD-BB1E15CF5E10}"/>
-              </a:ext>
-            </a:extLst>
-          </p:cNvPr>
-          <p:cNvGrpSpPr/>
-          <p:nvPr/>
-        </p:nvGrpSpPr>
-        <p:grpSpPr>
-          <a:xfrm>
-            <a:off x="404668" y="-706139"/>
-            <a:ext cx="11887884" cy="7554192"/>
-            <a:chOff x="404668" y="-706139"/>
-            <a:chExt cx="11832080" cy="7554192"/>
-          </a:xfrm>
-        </p:grpSpPr>
-        <p:sp>
-          <p:nvSpPr>
-            <p:cNvPr id="5" name="Rectangle 4">
-              <a:extLst>
-                <a:ext uri="{FF2B5EF4-FFF2-40B4-BE49-F238E27FC236}">
-                  <a16:creationId xmlns:a16="http://schemas.microsoft.com/office/drawing/2014/main" id="{C94C70DA-1A67-46D7-932D-06E67AB28A7F}"/>
-                </a:ext>
-              </a:extLst>
-            </p:cNvPr>
-            <p:cNvSpPr/>
-            <p:nvPr/>
-          </p:nvSpPr>
-          <p:spPr>
-            <a:xfrm>
-              <a:off x="406408" y="106827"/>
-              <a:ext cx="2032001" cy="709851"/>
-            </a:xfrm>
-            <a:prstGeom prst="rect">
-              <a:avLst/>
-            </a:prstGeom>
-            <a:solidFill>
-              <a:srgbClr val="CCFFFF"/>
-            </a:solidFill>
-            <a:ln>
-              <a:solidFill>
-                <a:srgbClr val="000000"/>
-              </a:solidFill>
-            </a:ln>
-          </p:spPr>
-          <p:style>
-            <a:lnRef idx="2">
-              <a:schemeClr val="accent1">
-                <a:shade val="50000"/>
-              </a:schemeClr>
-            </a:lnRef>
-            <a:fillRef idx="1">
-              <a:schemeClr val="accent1"/>
-            </a:fillRef>
-            <a:effectRef idx="0">
-              <a:schemeClr val="accent1"/>
-            </a:effectRef>
-            <a:fontRef idx="minor">
-              <a:schemeClr val="lt1"/>
-            </a:fontRef>
-          </p:style>
-          <p:txBody>
-            <a:bodyPr rtlCol="0" anchor="ctr"/>
-            <a:lstStyle/>
-            <a:p>
-              <a:pPr algn="ctr"/>
-              <a:r>
-                <a:rPr lang="en-SG" sz="2400" dirty="0">
-                  <a:solidFill>
-                    <a:schemeClr val="tx1"/>
-                  </a:solidFill>
-                </a:rPr>
-                <a:t>Correlation Coefficient (R)</a:t>
-              </a:r>
-            </a:p>
-          </p:txBody>
-        </p:sp>
-        <p:cxnSp>
-          <p:nvCxnSpPr>
-            <p:cNvPr id="6" name="Straight Arrow Connector 5">
-              <a:extLst>
-                <a:ext uri="{FF2B5EF4-FFF2-40B4-BE49-F238E27FC236}">
-                  <a16:creationId xmlns:a16="http://schemas.microsoft.com/office/drawing/2014/main" id="{1A31F963-1AE2-437D-9399-0704C188BB49}"/>
-                </a:ext>
-              </a:extLst>
-            </p:cNvPr>
-            <p:cNvCxnSpPr>
-              <a:cxnSpLocks/>
-              <a:stCxn id="5" idx="3"/>
-              <a:endCxn id="7" idx="1"/>
-            </p:cNvCxnSpPr>
-            <p:nvPr/>
-          </p:nvCxnSpPr>
-          <p:spPr>
-            <a:xfrm flipV="1">
-              <a:off x="2438409" y="458823"/>
-              <a:ext cx="1032887" cy="2930"/>
-            </a:xfrm>
-            <a:prstGeom prst="straightConnector1">
-              <a:avLst/>
-            </a:prstGeom>
-            <a:ln w="38100">
-              <a:solidFill>
-                <a:srgbClr val="99CC00"/>
-              </a:solidFill>
-              <a:tailEnd type="triangle"/>
-            </a:ln>
-          </p:spPr>
-          <p:style>
-            <a:lnRef idx="1">
-              <a:schemeClr val="accent1"/>
-            </a:lnRef>
-            <a:fillRef idx="0">
-              <a:schemeClr val="accent1"/>
-            </a:fillRef>
-            <a:effectRef idx="0">
-              <a:schemeClr val="accent1"/>
-            </a:effectRef>
-            <a:fontRef idx="minor">
-              <a:schemeClr val="tx1"/>
-            </a:fontRef>
-          </p:style>
-        </p:cxnSp>
-        <p:sp>
-          <p:nvSpPr>
-            <p:cNvPr id="7" name="Rectangle 6">
-              <a:extLst>
-                <a:ext uri="{FF2B5EF4-FFF2-40B4-BE49-F238E27FC236}">
-                  <a16:creationId xmlns:a16="http://schemas.microsoft.com/office/drawing/2014/main" id="{8BE3A876-D4B8-4811-B4C2-B6803DAE98A3}"/>
-                </a:ext>
-              </a:extLst>
-            </p:cNvPr>
-            <p:cNvSpPr/>
-            <p:nvPr/>
-          </p:nvSpPr>
-          <p:spPr>
-            <a:xfrm>
-              <a:off x="3471296" y="93062"/>
-              <a:ext cx="2474274" cy="731521"/>
-            </a:xfrm>
-            <a:prstGeom prst="rect">
-              <a:avLst/>
-            </a:prstGeom>
-            <a:solidFill>
-              <a:srgbClr val="CCFFFF"/>
-            </a:solidFill>
-            <a:ln>
-              <a:solidFill>
-                <a:srgbClr val="000000"/>
-              </a:solidFill>
-            </a:ln>
-          </p:spPr>
-          <p:style>
-            <a:lnRef idx="2">
-              <a:schemeClr val="accent1">
-                <a:shade val="50000"/>
-              </a:schemeClr>
-            </a:lnRef>
-            <a:fillRef idx="1">
-              <a:schemeClr val="accent1"/>
-            </a:fillRef>
-            <a:effectRef idx="0">
-              <a:schemeClr val="accent1"/>
-            </a:effectRef>
-            <a:fontRef idx="minor">
-              <a:schemeClr val="lt1"/>
-            </a:fontRef>
-          </p:style>
-          <p:txBody>
-            <a:bodyPr rtlCol="0" anchor="ctr"/>
-            <a:lstStyle/>
-            <a:p>
-              <a:pPr algn="ctr"/>
-              <a:r>
-                <a:rPr lang="en-US" sz="2400" dirty="0">
-                  <a:solidFill>
-                    <a:schemeClr val="tx1"/>
-                  </a:solidFill>
-                </a:rPr>
-                <a:t>Percent Residual Accuracy</a:t>
-              </a:r>
-              <a:endParaRPr lang="en-SG" sz="2400" dirty="0">
-                <a:solidFill>
-                  <a:schemeClr val="tx1"/>
-                </a:solidFill>
-              </a:endParaRPr>
-            </a:p>
-          </p:txBody>
-        </p:sp>
-        <p:sp>
-          <p:nvSpPr>
-            <p:cNvPr id="8" name="Rectangle 7">
-              <a:extLst>
-                <a:ext uri="{FF2B5EF4-FFF2-40B4-BE49-F238E27FC236}">
-                  <a16:creationId xmlns:a16="http://schemas.microsoft.com/office/drawing/2014/main" id="{1D4F2D49-FA5E-40F7-83A1-1F79F5637169}"/>
-                </a:ext>
-              </a:extLst>
-            </p:cNvPr>
-            <p:cNvSpPr/>
-            <p:nvPr/>
-          </p:nvSpPr>
-          <p:spPr>
-            <a:xfrm>
-              <a:off x="9753346" y="1088274"/>
-              <a:ext cx="2032001" cy="731521"/>
-            </a:xfrm>
-            <a:prstGeom prst="rect">
-              <a:avLst/>
-            </a:prstGeom>
-            <a:solidFill>
-              <a:schemeClr val="accent6">
-                <a:lumMod val="20000"/>
-                <a:lumOff val="80000"/>
-              </a:schemeClr>
-            </a:solidFill>
-            <a:ln>
-              <a:solidFill>
-                <a:srgbClr val="000000"/>
-              </a:solidFill>
-            </a:ln>
-          </p:spPr>
-          <p:style>
-            <a:lnRef idx="2">
-              <a:schemeClr val="accent1">
-                <a:shade val="50000"/>
-              </a:schemeClr>
-            </a:lnRef>
-            <a:fillRef idx="1">
-              <a:schemeClr val="accent1"/>
-            </a:fillRef>
-            <a:effectRef idx="0">
-              <a:schemeClr val="accent1"/>
-            </a:effectRef>
-            <a:fontRef idx="minor">
-              <a:schemeClr val="lt1"/>
-            </a:fontRef>
-          </p:style>
-          <p:txBody>
-            <a:bodyPr rtlCol="0" anchor="ctr"/>
-            <a:lstStyle/>
-            <a:p>
-              <a:pPr algn="ctr"/>
-              <a:r>
-                <a:rPr lang="en-SG" sz="2400" dirty="0">
-                  <a:solidFill>
-                    <a:schemeClr val="tx1"/>
-                  </a:solidFill>
-                </a:rPr>
-                <a:t>Poor Linearity</a:t>
-              </a:r>
-            </a:p>
-          </p:txBody>
-        </p:sp>
-        <p:sp>
-          <p:nvSpPr>
-            <p:cNvPr id="9" name="TextBox 8">
-              <a:extLst>
-                <a:ext uri="{FF2B5EF4-FFF2-40B4-BE49-F238E27FC236}">
-                  <a16:creationId xmlns:a16="http://schemas.microsoft.com/office/drawing/2014/main" id="{ABAE04C6-058F-45BB-A890-240C5AD2A1A6}"/>
-                </a:ext>
-              </a:extLst>
-            </p:cNvPr>
-            <p:cNvSpPr txBox="1"/>
-            <p:nvPr/>
-          </p:nvSpPr>
-          <p:spPr>
-            <a:xfrm>
-              <a:off x="2496621" y="40699"/>
-              <a:ext cx="1036397" cy="461665"/>
-            </a:xfrm>
-            <a:prstGeom prst="rect">
-              <a:avLst/>
-            </a:prstGeom>
-            <a:noFill/>
-          </p:spPr>
-          <p:txBody>
-            <a:bodyPr wrap="square" rtlCol="0">
-              <a:spAutoFit/>
-            </a:bodyPr>
-            <a:lstStyle/>
-            <a:p>
-              <a:r>
-                <a:rPr lang="en-SG" sz="2400" dirty="0"/>
-                <a:t>&gt;= 0.8</a:t>
-              </a:r>
-            </a:p>
-          </p:txBody>
-        </p:sp>
-        <p:sp>
-          <p:nvSpPr>
-            <p:cNvPr id="10" name="TextBox 9">
-              <a:extLst>
-                <a:ext uri="{FF2B5EF4-FFF2-40B4-BE49-F238E27FC236}">
-                  <a16:creationId xmlns:a16="http://schemas.microsoft.com/office/drawing/2014/main" id="{BA68A542-1BE7-4C68-B04E-1E04B5A297A9}"/>
-                </a:ext>
-              </a:extLst>
-            </p:cNvPr>
-            <p:cNvSpPr txBox="1"/>
-            <p:nvPr/>
-          </p:nvSpPr>
-          <p:spPr>
-            <a:xfrm>
-              <a:off x="1449775" y="904523"/>
-              <a:ext cx="933104" cy="461665"/>
-            </a:xfrm>
-            <a:prstGeom prst="rect">
-              <a:avLst/>
-            </a:prstGeom>
-            <a:noFill/>
-          </p:spPr>
-          <p:txBody>
-            <a:bodyPr wrap="square" rtlCol="0">
-              <a:spAutoFit/>
-            </a:bodyPr>
-            <a:lstStyle/>
-            <a:p>
-              <a:r>
-                <a:rPr lang="en-SG" sz="2400" dirty="0"/>
-                <a:t>&lt; 0.8</a:t>
-              </a:r>
-            </a:p>
-          </p:txBody>
-        </p:sp>
-        <p:sp>
-          <p:nvSpPr>
-            <p:cNvPr id="11" name="TextBox 10">
-              <a:extLst>
-                <a:ext uri="{FF2B5EF4-FFF2-40B4-BE49-F238E27FC236}">
-                  <a16:creationId xmlns:a16="http://schemas.microsoft.com/office/drawing/2014/main" id="{11F5E3E3-E70B-47EA-9734-1DC0620CC5DF}"/>
-                </a:ext>
-              </a:extLst>
-            </p:cNvPr>
-            <p:cNvSpPr txBox="1"/>
-            <p:nvPr/>
-          </p:nvSpPr>
-          <p:spPr>
-            <a:xfrm>
-              <a:off x="4720620" y="876946"/>
-              <a:ext cx="963185" cy="461665"/>
-            </a:xfrm>
-            <a:prstGeom prst="rect">
-              <a:avLst/>
-            </a:prstGeom>
-            <a:noFill/>
-          </p:spPr>
-          <p:txBody>
-            <a:bodyPr wrap="square" rtlCol="0">
-              <a:spAutoFit/>
-            </a:bodyPr>
-            <a:lstStyle/>
-            <a:p>
-              <a:r>
-                <a:rPr lang="en-SG" sz="2400" dirty="0"/>
-                <a:t>&lt; 80%</a:t>
-              </a:r>
-            </a:p>
-          </p:txBody>
-        </p:sp>
-        <p:sp>
-          <p:nvSpPr>
-            <p:cNvPr id="12" name="Rectangle 11">
-              <a:extLst>
-                <a:ext uri="{FF2B5EF4-FFF2-40B4-BE49-F238E27FC236}">
-                  <a16:creationId xmlns:a16="http://schemas.microsoft.com/office/drawing/2014/main" id="{6A56D423-EFB3-4C5E-8FE3-AE95F35C2275}"/>
-                </a:ext>
-              </a:extLst>
-            </p:cNvPr>
-            <p:cNvSpPr/>
-            <p:nvPr/>
-          </p:nvSpPr>
-          <p:spPr>
-            <a:xfrm>
-              <a:off x="9753346" y="79449"/>
-              <a:ext cx="2032001" cy="731521"/>
-            </a:xfrm>
-            <a:prstGeom prst="rect">
-              <a:avLst/>
-            </a:prstGeom>
-            <a:solidFill>
-              <a:schemeClr val="accent6">
-                <a:lumMod val="20000"/>
-                <a:lumOff val="80000"/>
-              </a:schemeClr>
-            </a:solidFill>
-            <a:ln>
-              <a:solidFill>
-                <a:srgbClr val="000000"/>
-              </a:solidFill>
-            </a:ln>
-          </p:spPr>
-          <p:style>
-            <a:lnRef idx="2">
-              <a:schemeClr val="accent1">
-                <a:shade val="50000"/>
-              </a:schemeClr>
-            </a:lnRef>
-            <a:fillRef idx="1">
-              <a:schemeClr val="accent1"/>
-            </a:fillRef>
-            <a:effectRef idx="0">
-              <a:schemeClr val="accent1"/>
-            </a:effectRef>
-            <a:fontRef idx="minor">
-              <a:schemeClr val="lt1"/>
-            </a:fontRef>
-          </p:style>
-          <p:txBody>
-            <a:bodyPr rtlCol="0" anchor="ctr"/>
-            <a:lstStyle/>
-            <a:p>
-              <a:pPr algn="ctr"/>
-              <a:r>
-                <a:rPr lang="en-SG" sz="2400" dirty="0">
-                  <a:solidFill>
-                    <a:schemeClr val="tx1"/>
-                  </a:solidFill>
-                </a:rPr>
-                <a:t>Good Linearity</a:t>
-              </a:r>
-            </a:p>
-          </p:txBody>
-        </p:sp>
-        <p:cxnSp>
-          <p:nvCxnSpPr>
-            <p:cNvPr id="13" name="Straight Arrow Connector 12">
-              <a:extLst>
-                <a:ext uri="{FF2B5EF4-FFF2-40B4-BE49-F238E27FC236}">
-                  <a16:creationId xmlns:a16="http://schemas.microsoft.com/office/drawing/2014/main" id="{5331DF66-0540-4727-ADFE-2C861ECAAD56}"/>
-                </a:ext>
-              </a:extLst>
-            </p:cNvPr>
-            <p:cNvCxnSpPr>
-              <a:cxnSpLocks/>
-              <a:stCxn id="7" idx="3"/>
-              <a:endCxn id="12" idx="1"/>
-            </p:cNvCxnSpPr>
-            <p:nvPr/>
-          </p:nvCxnSpPr>
-          <p:spPr>
-            <a:xfrm flipV="1">
-              <a:off x="5945570" y="445210"/>
-              <a:ext cx="3807776" cy="13613"/>
-            </a:xfrm>
-            <a:prstGeom prst="straightConnector1">
-              <a:avLst/>
-            </a:prstGeom>
-            <a:ln w="38100">
-              <a:solidFill>
-                <a:srgbClr val="99CC00"/>
-              </a:solidFill>
-              <a:tailEnd type="triangle"/>
-            </a:ln>
-          </p:spPr>
-          <p:style>
-            <a:lnRef idx="1">
-              <a:schemeClr val="accent1"/>
-            </a:lnRef>
-            <a:fillRef idx="0">
-              <a:schemeClr val="accent1"/>
-            </a:fillRef>
-            <a:effectRef idx="0">
-              <a:schemeClr val="accent1"/>
-            </a:effectRef>
-            <a:fontRef idx="minor">
-              <a:schemeClr val="tx1"/>
-            </a:fontRef>
-          </p:style>
-        </p:cxnSp>
-        <p:sp>
-          <p:nvSpPr>
-            <p:cNvPr id="14" name="TextBox 13">
-              <a:extLst>
-                <a:ext uri="{FF2B5EF4-FFF2-40B4-BE49-F238E27FC236}">
-                  <a16:creationId xmlns:a16="http://schemas.microsoft.com/office/drawing/2014/main" id="{21C29405-CF84-472A-B80F-262ECA405BBC}"/>
-                </a:ext>
-              </a:extLst>
-            </p:cNvPr>
-            <p:cNvSpPr txBox="1"/>
-            <p:nvPr/>
-          </p:nvSpPr>
-          <p:spPr>
-            <a:xfrm>
-              <a:off x="7206599" y="30886"/>
-              <a:ext cx="1169016" cy="461665"/>
-            </a:xfrm>
-            <a:prstGeom prst="rect">
-              <a:avLst/>
-            </a:prstGeom>
-            <a:noFill/>
-          </p:spPr>
-          <p:txBody>
-            <a:bodyPr wrap="square" rtlCol="0">
-              <a:spAutoFit/>
-            </a:bodyPr>
-            <a:lstStyle/>
-            <a:p>
-              <a:r>
-                <a:rPr lang="en-SG" sz="2400" dirty="0"/>
-                <a:t>&gt;= 80%</a:t>
-              </a:r>
-            </a:p>
-          </p:txBody>
-        </p:sp>
-        <p:cxnSp>
-          <p:nvCxnSpPr>
-            <p:cNvPr id="15" name="Connector: Elbow 14">
-              <a:extLst>
-                <a:ext uri="{FF2B5EF4-FFF2-40B4-BE49-F238E27FC236}">
-                  <a16:creationId xmlns:a16="http://schemas.microsoft.com/office/drawing/2014/main" id="{A902D536-916F-41F0-BAAF-EE3705BCDFBF}"/>
-                </a:ext>
-              </a:extLst>
-            </p:cNvPr>
-            <p:cNvCxnSpPr>
-              <a:cxnSpLocks/>
-              <a:stCxn id="7" idx="2"/>
-              <a:endCxn id="8" idx="1"/>
-            </p:cNvCxnSpPr>
-            <p:nvPr/>
-          </p:nvCxnSpPr>
-          <p:spPr>
-            <a:xfrm rot="16200000" flipH="1">
-              <a:off x="6916163" y="-1383148"/>
-              <a:ext cx="629452" cy="5044913"/>
-            </a:xfrm>
-            <a:prstGeom prst="bentConnector2">
-              <a:avLst/>
-            </a:prstGeom>
-            <a:ln w="38100">
-              <a:solidFill>
-                <a:srgbClr val="7030A0"/>
-              </a:solidFill>
-              <a:tailEnd type="triangle"/>
-            </a:ln>
-          </p:spPr>
-          <p:style>
-            <a:lnRef idx="1">
-              <a:schemeClr val="accent1"/>
-            </a:lnRef>
-            <a:fillRef idx="0">
-              <a:schemeClr val="accent1"/>
-            </a:fillRef>
-            <a:effectRef idx="0">
-              <a:schemeClr val="accent1"/>
-            </a:effectRef>
-            <a:fontRef idx="minor">
-              <a:schemeClr val="tx1"/>
-            </a:fontRef>
-          </p:style>
-        </p:cxnSp>
-        <p:cxnSp>
-          <p:nvCxnSpPr>
-            <p:cNvPr id="16" name="Connector: Elbow 15">
-              <a:extLst>
-                <a:ext uri="{FF2B5EF4-FFF2-40B4-BE49-F238E27FC236}">
-                  <a16:creationId xmlns:a16="http://schemas.microsoft.com/office/drawing/2014/main" id="{459CE4D0-7D29-42FB-8A0A-AE0724909B98}"/>
-                </a:ext>
-              </a:extLst>
-            </p:cNvPr>
-            <p:cNvCxnSpPr>
-              <a:cxnSpLocks/>
-              <a:stCxn id="5" idx="2"/>
-              <a:endCxn id="8" idx="1"/>
-            </p:cNvCxnSpPr>
-            <p:nvPr/>
-          </p:nvCxnSpPr>
-          <p:spPr>
-            <a:xfrm rot="16200000" flipH="1">
-              <a:off x="5269199" y="-3030113"/>
-              <a:ext cx="637357" cy="8330937"/>
-            </a:xfrm>
-            <a:prstGeom prst="bentConnector2">
-              <a:avLst/>
-            </a:prstGeom>
-            <a:ln w="38100">
-              <a:solidFill>
-                <a:srgbClr val="7030A0"/>
-              </a:solidFill>
-              <a:tailEnd type="triangle"/>
-            </a:ln>
-          </p:spPr>
-          <p:style>
-            <a:lnRef idx="1">
-              <a:schemeClr val="accent1"/>
-            </a:lnRef>
-            <a:fillRef idx="0">
-              <a:schemeClr val="accent1"/>
-            </a:fillRef>
-            <a:effectRef idx="0">
-              <a:schemeClr val="accent1"/>
-            </a:effectRef>
-            <a:fontRef idx="minor">
-              <a:schemeClr val="tx1"/>
-            </a:fontRef>
-          </p:style>
-        </p:cxnSp>
-        <p:grpSp>
-          <p:nvGrpSpPr>
-            <p:cNvPr id="17" name="Group 16">
-              <a:extLst>
-                <a:ext uri="{FF2B5EF4-FFF2-40B4-BE49-F238E27FC236}">
-                  <a16:creationId xmlns:a16="http://schemas.microsoft.com/office/drawing/2014/main" id="{75EDCE0F-7C6A-42E4-BA4D-88444DF2788D}"/>
-                </a:ext>
-              </a:extLst>
-            </p:cNvPr>
-            <p:cNvGrpSpPr/>
-            <p:nvPr/>
-          </p:nvGrpSpPr>
-          <p:grpSpPr>
-            <a:xfrm>
-              <a:off x="406409" y="2527609"/>
-              <a:ext cx="11830339" cy="4320444"/>
-              <a:chOff x="354561" y="598145"/>
-              <a:chExt cx="11830339" cy="4320444"/>
-            </a:xfrm>
-          </p:grpSpPr>
-          <p:cxnSp>
-            <p:nvCxnSpPr>
-              <p:cNvPr id="18" name="Straight Arrow Connector 17">
-                <a:extLst>
-                  <a:ext uri="{FF2B5EF4-FFF2-40B4-BE49-F238E27FC236}">
-                    <a16:creationId xmlns:a16="http://schemas.microsoft.com/office/drawing/2014/main" id="{51C1A874-29E6-447D-97DC-E718E4682AFE}"/>
-                  </a:ext>
-                </a:extLst>
-              </p:cNvPr>
-              <p:cNvCxnSpPr>
-                <a:cxnSpLocks/>
-                <a:stCxn id="39" idx="3"/>
-                <a:endCxn id="19" idx="1"/>
-              </p:cNvCxnSpPr>
-              <p:nvPr/>
-            </p:nvCxnSpPr>
-            <p:spPr>
-              <a:xfrm flipV="1">
-                <a:off x="2386562" y="1061582"/>
-                <a:ext cx="992310" cy="3318"/>
-              </a:xfrm>
-              <a:prstGeom prst="straightConnector1">
-                <a:avLst/>
-              </a:prstGeom>
-              <a:ln w="38100">
-                <a:solidFill>
-                  <a:srgbClr val="99CC00"/>
-                </a:solidFill>
-                <a:tailEnd type="triangle"/>
-              </a:ln>
-            </p:spPr>
-            <p:style>
-              <a:lnRef idx="1">
-                <a:schemeClr val="accent1"/>
-              </a:lnRef>
-              <a:fillRef idx="0">
-                <a:schemeClr val="accent1"/>
-              </a:fillRef>
-              <a:effectRef idx="0">
-                <a:schemeClr val="accent1"/>
-              </a:effectRef>
-              <a:fontRef idx="minor">
-                <a:schemeClr val="tx1"/>
-              </a:fontRef>
-            </p:style>
-          </p:cxnSp>
-          <p:sp>
-            <p:nvSpPr>
-              <p:cNvPr id="19" name="Rectangle 18">
-                <a:extLst>
-                  <a:ext uri="{FF2B5EF4-FFF2-40B4-BE49-F238E27FC236}">
-                    <a16:creationId xmlns:a16="http://schemas.microsoft.com/office/drawing/2014/main" id="{38CE6B07-8782-490D-BB4C-C04F6910642A}"/>
-                  </a:ext>
-                </a:extLst>
-              </p:cNvPr>
-              <p:cNvSpPr/>
-              <p:nvPr/>
-            </p:nvSpPr>
-            <p:spPr>
-              <a:xfrm>
-                <a:off x="3378872" y="695821"/>
-                <a:ext cx="2474274" cy="731521"/>
-              </a:xfrm>
-              <a:prstGeom prst="rect">
-                <a:avLst/>
-              </a:prstGeom>
-              <a:solidFill>
-                <a:srgbClr val="CCFFFF"/>
-              </a:solidFill>
-              <a:ln>
-                <a:solidFill>
-                  <a:srgbClr val="000000"/>
-                </a:solidFill>
-              </a:ln>
-            </p:spPr>
-            <p:style>
-              <a:lnRef idx="2">
-                <a:schemeClr val="accent1">
-                  <a:shade val="50000"/>
-                </a:schemeClr>
-              </a:lnRef>
-              <a:fillRef idx="1">
-                <a:schemeClr val="accent1"/>
-              </a:fillRef>
-              <a:effectRef idx="0">
-                <a:schemeClr val="accent1"/>
-              </a:effectRef>
-              <a:fontRef idx="minor">
-                <a:schemeClr val="lt1"/>
-              </a:fontRef>
-            </p:style>
-            <p:txBody>
-              <a:bodyPr rtlCol="0" anchor="ctr"/>
-              <a:lstStyle/>
-              <a:p>
-                <a:pPr algn="ctr"/>
-                <a:r>
-                  <a:rPr lang="en-US" sz="2400" dirty="0">
-                    <a:solidFill>
-                      <a:schemeClr val="tx1"/>
-                    </a:solidFill>
-                  </a:rPr>
-                  <a:t>Percent Residual Accuracy</a:t>
-                </a:r>
-                <a:endParaRPr lang="en-SG" sz="2400" dirty="0">
-                  <a:solidFill>
-                    <a:schemeClr val="tx1"/>
-                  </a:solidFill>
-                </a:endParaRPr>
-              </a:p>
-            </p:txBody>
-          </p:sp>
-          <p:sp>
-            <p:nvSpPr>
-              <p:cNvPr id="20" name="Rectangle 19">
-                <a:extLst>
-                  <a:ext uri="{FF2B5EF4-FFF2-40B4-BE49-F238E27FC236}">
-                    <a16:creationId xmlns:a16="http://schemas.microsoft.com/office/drawing/2014/main" id="{74FA55BF-DEFE-40E8-BD35-450D4F7EA69A}"/>
-                  </a:ext>
-                </a:extLst>
-              </p:cNvPr>
-              <p:cNvSpPr/>
-              <p:nvPr/>
-            </p:nvSpPr>
-            <p:spPr>
-              <a:xfrm>
-                <a:off x="3324674" y="2355205"/>
-                <a:ext cx="2585034" cy="856733"/>
-              </a:xfrm>
-              <a:prstGeom prst="rect">
-                <a:avLst/>
-              </a:prstGeom>
-              <a:solidFill>
-                <a:srgbClr val="CCFFFF"/>
-              </a:solidFill>
-              <a:ln>
-                <a:solidFill>
-                  <a:srgbClr val="000000"/>
-                </a:solidFill>
-              </a:ln>
-            </p:spPr>
-            <p:style>
-              <a:lnRef idx="2">
-                <a:schemeClr val="accent1">
-                  <a:shade val="50000"/>
-                </a:schemeClr>
-              </a:lnRef>
-              <a:fillRef idx="1">
-                <a:schemeClr val="accent1"/>
-              </a:fillRef>
-              <a:effectRef idx="0">
-                <a:schemeClr val="accent1"/>
-              </a:effectRef>
-              <a:fontRef idx="minor">
-                <a:schemeClr val="lt1"/>
-              </a:fontRef>
-            </p:style>
-            <p:txBody>
-              <a:bodyPr rtlCol="0" anchor="ctr"/>
-              <a:lstStyle/>
-              <a:p>
-                <a:pPr algn="ctr"/>
-                <a:r>
-                  <a:rPr lang="en-US" sz="2400" dirty="0">
-                    <a:solidFill>
-                      <a:schemeClr val="tx1"/>
-                    </a:solidFill>
-                  </a:rPr>
-                  <a:t>Mandel Fitting Test</a:t>
-                </a:r>
-              </a:p>
-              <a:p>
-                <a:pPr algn="ctr"/>
-                <a:r>
-                  <a:rPr lang="en-US" sz="2400" dirty="0">
-                    <a:solidFill>
-                      <a:schemeClr val="tx1"/>
-                    </a:solidFill>
-                  </a:rPr>
-                  <a:t>p value</a:t>
-                </a:r>
-                <a:endParaRPr lang="en-SG" sz="2400" dirty="0">
-                  <a:solidFill>
-                    <a:schemeClr val="tx1"/>
-                  </a:solidFill>
-                </a:endParaRPr>
-              </a:p>
-            </p:txBody>
-          </p:sp>
-          <p:sp>
-            <p:nvSpPr>
-              <p:cNvPr id="21" name="Rectangle 20">
-                <a:extLst>
-                  <a:ext uri="{FF2B5EF4-FFF2-40B4-BE49-F238E27FC236}">
-                    <a16:creationId xmlns:a16="http://schemas.microsoft.com/office/drawing/2014/main" id="{4A7D1205-C675-4653-95E9-4ECACCEE333D}"/>
-                  </a:ext>
-                </a:extLst>
-              </p:cNvPr>
-              <p:cNvSpPr/>
-              <p:nvPr/>
-            </p:nvSpPr>
-            <p:spPr>
-              <a:xfrm>
-                <a:off x="6868461" y="2355205"/>
-                <a:ext cx="2032001" cy="856733"/>
-              </a:xfrm>
-              <a:prstGeom prst="rect">
-                <a:avLst/>
-              </a:prstGeom>
-              <a:solidFill>
-                <a:srgbClr val="CCFFFF"/>
-              </a:solidFill>
-              <a:ln>
-                <a:solidFill>
-                  <a:srgbClr val="000000"/>
-                </a:solidFill>
-              </a:ln>
-            </p:spPr>
-            <p:style>
-              <a:lnRef idx="2">
-                <a:schemeClr val="accent1">
-                  <a:shade val="50000"/>
-                </a:schemeClr>
-              </a:lnRef>
-              <a:fillRef idx="1">
-                <a:schemeClr val="accent1"/>
-              </a:fillRef>
-              <a:effectRef idx="0">
-                <a:schemeClr val="accent1"/>
-              </a:effectRef>
-              <a:fontRef idx="minor">
-                <a:schemeClr val="lt1"/>
-              </a:fontRef>
-            </p:style>
-            <p:txBody>
-              <a:bodyPr rtlCol="0" anchor="ctr"/>
-              <a:lstStyle/>
-              <a:p>
-                <a:pPr algn="ctr"/>
-                <a:r>
-                  <a:rPr lang="en-SG" sz="2400" dirty="0">
-                    <a:solidFill>
-                      <a:schemeClr val="tx1"/>
-                    </a:solidFill>
-                  </a:rPr>
-                  <a:t>Concavity</a:t>
-                </a:r>
-              </a:p>
-            </p:txBody>
-          </p:sp>
-          <p:sp>
-            <p:nvSpPr>
-              <p:cNvPr id="22" name="Rectangle 21">
-                <a:extLst>
-                  <a:ext uri="{FF2B5EF4-FFF2-40B4-BE49-F238E27FC236}">
-                    <a16:creationId xmlns:a16="http://schemas.microsoft.com/office/drawing/2014/main" id="{B8241480-DD62-4F93-9F7B-FCCD8B061EA4}"/>
-                  </a:ext>
-                </a:extLst>
-              </p:cNvPr>
-              <p:cNvSpPr/>
-              <p:nvPr/>
-            </p:nvSpPr>
-            <p:spPr>
-              <a:xfrm>
-                <a:off x="9701742" y="1686525"/>
-                <a:ext cx="2483158" cy="731521"/>
-              </a:xfrm>
-              <a:prstGeom prst="rect">
-                <a:avLst/>
-              </a:prstGeom>
-              <a:solidFill>
-                <a:schemeClr val="accent6">
-                  <a:lumMod val="20000"/>
-                  <a:lumOff val="80000"/>
-                </a:schemeClr>
-              </a:solidFill>
-              <a:ln>
-                <a:solidFill>
-                  <a:srgbClr val="000000"/>
-                </a:solidFill>
-              </a:ln>
-            </p:spPr>
-            <p:style>
-              <a:lnRef idx="2">
-                <a:schemeClr val="accent1">
-                  <a:shade val="50000"/>
-                </a:schemeClr>
-              </a:lnRef>
-              <a:fillRef idx="1">
-                <a:schemeClr val="accent1"/>
-              </a:fillRef>
-              <a:effectRef idx="0">
-                <a:schemeClr val="accent1"/>
-              </a:effectRef>
-              <a:fontRef idx="minor">
-                <a:schemeClr val="lt1"/>
-              </a:fontRef>
-            </p:style>
-            <p:txBody>
-              <a:bodyPr rtlCol="0" anchor="ctr"/>
-              <a:lstStyle/>
-              <a:p>
-                <a:pPr algn="ctr"/>
-                <a:r>
-                  <a:rPr lang="en-SG" sz="2400" dirty="0">
-                    <a:solidFill>
-                      <a:schemeClr val="tx1"/>
-                    </a:solidFill>
-                  </a:rPr>
-                  <a:t>Saturation Regime</a:t>
-                </a:r>
-              </a:p>
-            </p:txBody>
-          </p:sp>
-          <p:sp>
-            <p:nvSpPr>
-              <p:cNvPr id="23" name="Rectangle 22">
-                <a:extLst>
-                  <a:ext uri="{FF2B5EF4-FFF2-40B4-BE49-F238E27FC236}">
-                    <a16:creationId xmlns:a16="http://schemas.microsoft.com/office/drawing/2014/main" id="{74F27443-DC4D-4146-88A6-BFE183E50C10}"/>
-                  </a:ext>
-                </a:extLst>
-              </p:cNvPr>
-              <p:cNvSpPr/>
-              <p:nvPr/>
-            </p:nvSpPr>
-            <p:spPr>
-              <a:xfrm>
-                <a:off x="9701742" y="694050"/>
-                <a:ext cx="2032001" cy="731521"/>
-              </a:xfrm>
-              <a:prstGeom prst="rect">
-                <a:avLst/>
-              </a:prstGeom>
-              <a:solidFill>
-                <a:schemeClr val="accent6">
-                  <a:lumMod val="20000"/>
-                  <a:lumOff val="80000"/>
-                </a:schemeClr>
-              </a:solidFill>
-              <a:ln>
-                <a:solidFill>
-                  <a:srgbClr val="000000"/>
-                </a:solidFill>
-              </a:ln>
-            </p:spPr>
-            <p:style>
-              <a:lnRef idx="2">
-                <a:schemeClr val="accent1">
-                  <a:shade val="50000"/>
-                </a:schemeClr>
-              </a:lnRef>
-              <a:fillRef idx="1">
-                <a:schemeClr val="accent1"/>
-              </a:fillRef>
-              <a:effectRef idx="0">
-                <a:schemeClr val="accent1"/>
-              </a:effectRef>
-              <a:fontRef idx="minor">
-                <a:schemeClr val="lt1"/>
-              </a:fontRef>
-            </p:style>
-            <p:txBody>
-              <a:bodyPr rtlCol="0" anchor="ctr"/>
-              <a:lstStyle/>
-              <a:p>
-                <a:pPr algn="ctr"/>
-                <a:r>
-                  <a:rPr lang="en-SG" sz="2400" dirty="0">
-                    <a:solidFill>
-                      <a:schemeClr val="tx1"/>
-                    </a:solidFill>
-                  </a:rPr>
-                  <a:t>Good Linearity</a:t>
-                </a:r>
-              </a:p>
-            </p:txBody>
-          </p:sp>
-          <p:sp>
-            <p:nvSpPr>
-              <p:cNvPr id="24" name="Rectangle 23">
-                <a:extLst>
-                  <a:ext uri="{FF2B5EF4-FFF2-40B4-BE49-F238E27FC236}">
-                    <a16:creationId xmlns:a16="http://schemas.microsoft.com/office/drawing/2014/main" id="{8864B739-D169-40D1-A91D-5177242DE18B}"/>
-                  </a:ext>
-                </a:extLst>
-              </p:cNvPr>
-              <p:cNvSpPr/>
-              <p:nvPr/>
-            </p:nvSpPr>
-            <p:spPr>
-              <a:xfrm>
-                <a:off x="9692311" y="3163165"/>
-                <a:ext cx="2041189" cy="731521"/>
-              </a:xfrm>
-              <a:prstGeom prst="rect">
-                <a:avLst/>
-              </a:prstGeom>
-              <a:solidFill>
-                <a:schemeClr val="accent6">
-                  <a:lumMod val="20000"/>
-                  <a:lumOff val="80000"/>
-                </a:schemeClr>
-              </a:solidFill>
-              <a:ln>
-                <a:solidFill>
-                  <a:srgbClr val="000000"/>
-                </a:solidFill>
-              </a:ln>
-            </p:spPr>
-            <p:style>
-              <a:lnRef idx="2">
-                <a:schemeClr val="accent1">
-                  <a:shade val="50000"/>
-                </a:schemeClr>
-              </a:lnRef>
-              <a:fillRef idx="1">
-                <a:schemeClr val="accent1"/>
-              </a:fillRef>
-              <a:effectRef idx="0">
-                <a:schemeClr val="accent1"/>
-              </a:effectRef>
-              <a:fontRef idx="minor">
-                <a:schemeClr val="lt1"/>
-              </a:fontRef>
-            </p:style>
-            <p:txBody>
-              <a:bodyPr rtlCol="0" anchor="ctr"/>
-              <a:lstStyle/>
-              <a:p>
-                <a:pPr algn="ctr"/>
-                <a:r>
-                  <a:rPr lang="en-SG" sz="2400" dirty="0">
-                    <a:solidFill>
-                      <a:schemeClr val="tx1"/>
-                    </a:solidFill>
-                  </a:rPr>
-                  <a:t>Noise Regime</a:t>
-                </a:r>
-              </a:p>
-            </p:txBody>
-          </p:sp>
-          <p:sp>
-            <p:nvSpPr>
-              <p:cNvPr id="25" name="Rectangle 24">
-                <a:extLst>
-                  <a:ext uri="{FF2B5EF4-FFF2-40B4-BE49-F238E27FC236}">
-                    <a16:creationId xmlns:a16="http://schemas.microsoft.com/office/drawing/2014/main" id="{F4015FE8-ACAD-47BA-8459-01CBCAA6F11F}"/>
-                  </a:ext>
-                </a:extLst>
-              </p:cNvPr>
-              <p:cNvSpPr/>
-              <p:nvPr/>
-            </p:nvSpPr>
-            <p:spPr>
-              <a:xfrm>
-                <a:off x="9692312" y="4187068"/>
-                <a:ext cx="2032001" cy="731521"/>
-              </a:xfrm>
-              <a:prstGeom prst="rect">
-                <a:avLst/>
-              </a:prstGeom>
-              <a:solidFill>
-                <a:schemeClr val="accent6">
-                  <a:lumMod val="20000"/>
-                  <a:lumOff val="80000"/>
-                </a:schemeClr>
-              </a:solidFill>
-              <a:ln>
-                <a:solidFill>
-                  <a:srgbClr val="000000"/>
-                </a:solidFill>
-              </a:ln>
-            </p:spPr>
-            <p:style>
-              <a:lnRef idx="2">
-                <a:schemeClr val="accent1">
-                  <a:shade val="50000"/>
-                </a:schemeClr>
-              </a:lnRef>
-              <a:fillRef idx="1">
-                <a:schemeClr val="accent1"/>
-              </a:fillRef>
-              <a:effectRef idx="0">
-                <a:schemeClr val="accent1"/>
-              </a:effectRef>
-              <a:fontRef idx="minor">
-                <a:schemeClr val="lt1"/>
-              </a:fontRef>
-            </p:style>
-            <p:txBody>
-              <a:bodyPr rtlCol="0" anchor="ctr"/>
-              <a:lstStyle/>
-              <a:p>
-                <a:pPr algn="ctr"/>
-                <a:r>
-                  <a:rPr lang="en-SG" sz="2400" dirty="0">
-                    <a:solidFill>
-                      <a:schemeClr val="tx1"/>
-                    </a:solidFill>
-                  </a:rPr>
-                  <a:t>Poor Linearity</a:t>
-                </a:r>
-              </a:p>
-            </p:txBody>
-          </p:sp>
-          <p:cxnSp>
-            <p:nvCxnSpPr>
-              <p:cNvPr id="26" name="Straight Arrow Connector 25">
-                <a:extLst>
-                  <a:ext uri="{FF2B5EF4-FFF2-40B4-BE49-F238E27FC236}">
-                    <a16:creationId xmlns:a16="http://schemas.microsoft.com/office/drawing/2014/main" id="{9034CF5A-8921-4C2D-A4C2-D7CDA1C78AF3}"/>
-                  </a:ext>
-                </a:extLst>
-              </p:cNvPr>
-              <p:cNvCxnSpPr>
-                <a:cxnSpLocks/>
-                <a:stCxn id="20" idx="3"/>
-                <a:endCxn id="21" idx="1"/>
-              </p:cNvCxnSpPr>
-              <p:nvPr/>
-            </p:nvCxnSpPr>
-            <p:spPr>
-              <a:xfrm>
-                <a:off x="5909708" y="2783572"/>
-                <a:ext cx="958753" cy="0"/>
-              </a:xfrm>
-              <a:prstGeom prst="straightConnector1">
-                <a:avLst/>
-              </a:prstGeom>
-              <a:ln w="38100">
-                <a:solidFill>
-                  <a:schemeClr val="accent6">
-                    <a:lumMod val="50000"/>
-                  </a:schemeClr>
-                </a:solidFill>
-                <a:tailEnd type="triangle"/>
-              </a:ln>
-            </p:spPr>
-            <p:style>
-              <a:lnRef idx="1">
-                <a:schemeClr val="accent1"/>
-              </a:lnRef>
-              <a:fillRef idx="0">
-                <a:schemeClr val="accent1"/>
-              </a:fillRef>
-              <a:effectRef idx="0">
-                <a:schemeClr val="accent1"/>
-              </a:effectRef>
-              <a:fontRef idx="minor">
-                <a:schemeClr val="tx1"/>
-              </a:fontRef>
-            </p:style>
-          </p:cxnSp>
-          <p:cxnSp>
-            <p:nvCxnSpPr>
-              <p:cNvPr id="27" name="Straight Arrow Connector 26">
-                <a:extLst>
-                  <a:ext uri="{FF2B5EF4-FFF2-40B4-BE49-F238E27FC236}">
-                    <a16:creationId xmlns:a16="http://schemas.microsoft.com/office/drawing/2014/main" id="{9A3BECA7-2930-4A0C-BB31-A658CF573918}"/>
-                  </a:ext>
-                </a:extLst>
-              </p:cNvPr>
-              <p:cNvCxnSpPr>
-                <a:cxnSpLocks/>
-                <a:stCxn id="19" idx="2"/>
-                <a:endCxn id="20" idx="0"/>
-              </p:cNvCxnSpPr>
-              <p:nvPr/>
-            </p:nvCxnSpPr>
-            <p:spPr>
-              <a:xfrm>
-                <a:off x="4616009" y="1427342"/>
-                <a:ext cx="1182" cy="927863"/>
-              </a:xfrm>
-              <a:prstGeom prst="straightConnector1">
-                <a:avLst/>
-              </a:prstGeom>
-              <a:ln w="38100">
-                <a:solidFill>
-                  <a:schemeClr val="accent6">
-                    <a:lumMod val="50000"/>
-                  </a:schemeClr>
-                </a:solidFill>
-                <a:tailEnd type="triangle"/>
-              </a:ln>
-            </p:spPr>
-            <p:style>
-              <a:lnRef idx="1">
-                <a:schemeClr val="accent1"/>
-              </a:lnRef>
-              <a:fillRef idx="0">
-                <a:schemeClr val="accent1"/>
-              </a:fillRef>
-              <a:effectRef idx="0">
-                <a:schemeClr val="accent1"/>
-              </a:effectRef>
-              <a:fontRef idx="minor">
-                <a:schemeClr val="tx1"/>
-              </a:fontRef>
-            </p:style>
-          </p:cxnSp>
-          <p:cxnSp>
-            <p:nvCxnSpPr>
-              <p:cNvPr id="28" name="Straight Arrow Connector 27">
-                <a:extLst>
-                  <a:ext uri="{FF2B5EF4-FFF2-40B4-BE49-F238E27FC236}">
-                    <a16:creationId xmlns:a16="http://schemas.microsoft.com/office/drawing/2014/main" id="{7E63EB9B-1F22-47A1-BDBF-908AA95C590D}"/>
-                  </a:ext>
-                </a:extLst>
-              </p:cNvPr>
-              <p:cNvCxnSpPr>
-                <a:cxnSpLocks/>
-                <a:stCxn id="19" idx="3"/>
-                <a:endCxn id="23" idx="1"/>
-              </p:cNvCxnSpPr>
-              <p:nvPr/>
-            </p:nvCxnSpPr>
-            <p:spPr>
-              <a:xfrm flipV="1">
-                <a:off x="5853146" y="1059811"/>
-                <a:ext cx="3848596" cy="1771"/>
-              </a:xfrm>
-              <a:prstGeom prst="straightConnector1">
-                <a:avLst/>
-              </a:prstGeom>
-              <a:ln w="38100">
-                <a:solidFill>
-                  <a:srgbClr val="99CC00"/>
-                </a:solidFill>
-                <a:tailEnd type="triangle"/>
-              </a:ln>
-            </p:spPr>
-            <p:style>
-              <a:lnRef idx="1">
-                <a:schemeClr val="accent1"/>
-              </a:lnRef>
-              <a:fillRef idx="0">
-                <a:schemeClr val="accent1"/>
-              </a:fillRef>
-              <a:effectRef idx="0">
-                <a:schemeClr val="accent1"/>
-              </a:effectRef>
-              <a:fontRef idx="minor">
-                <a:schemeClr val="tx1"/>
-              </a:fontRef>
-            </p:style>
-          </p:cxnSp>
-          <p:sp>
-            <p:nvSpPr>
-              <p:cNvPr id="29" name="TextBox 28">
-                <a:extLst>
-                  <a:ext uri="{FF2B5EF4-FFF2-40B4-BE49-F238E27FC236}">
-                    <a16:creationId xmlns:a16="http://schemas.microsoft.com/office/drawing/2014/main" id="{211C90F9-C041-4878-A720-286D0F6F08F0}"/>
-                  </a:ext>
-                </a:extLst>
-              </p:cNvPr>
-              <p:cNvSpPr txBox="1"/>
-              <p:nvPr/>
-            </p:nvSpPr>
-            <p:spPr>
-              <a:xfrm>
-                <a:off x="2449142" y="614688"/>
-                <a:ext cx="1036397" cy="461665"/>
-              </a:xfrm>
-              <a:prstGeom prst="rect">
-                <a:avLst/>
-              </a:prstGeom>
-              <a:noFill/>
-            </p:spPr>
-            <p:txBody>
-              <a:bodyPr wrap="square" rtlCol="0">
-                <a:spAutoFit/>
-              </a:bodyPr>
-              <a:lstStyle/>
-              <a:p>
-                <a:r>
-                  <a:rPr lang="en-SG" sz="2400" dirty="0"/>
-                  <a:t>&gt;= 0.8</a:t>
-                </a:r>
-              </a:p>
-            </p:txBody>
-          </p:sp>
-          <p:sp>
-            <p:nvSpPr>
-              <p:cNvPr id="30" name="TextBox 29">
-                <a:extLst>
-                  <a:ext uri="{FF2B5EF4-FFF2-40B4-BE49-F238E27FC236}">
-                    <a16:creationId xmlns:a16="http://schemas.microsoft.com/office/drawing/2014/main" id="{597998CC-4AEA-476F-81A8-E3311D8B887E}"/>
-                  </a:ext>
-                </a:extLst>
-              </p:cNvPr>
-              <p:cNvSpPr txBox="1"/>
-              <p:nvPr/>
-            </p:nvSpPr>
-            <p:spPr>
-              <a:xfrm>
-                <a:off x="1431635" y="1660440"/>
-                <a:ext cx="933104" cy="461665"/>
-              </a:xfrm>
-              <a:prstGeom prst="rect">
-                <a:avLst/>
-              </a:prstGeom>
-              <a:noFill/>
-            </p:spPr>
-            <p:txBody>
-              <a:bodyPr wrap="square" rtlCol="0">
-                <a:spAutoFit/>
-              </a:bodyPr>
-              <a:lstStyle/>
-              <a:p>
-                <a:r>
-                  <a:rPr lang="en-SG" sz="2400" dirty="0"/>
-                  <a:t>&lt; 0.8</a:t>
-                </a:r>
-              </a:p>
-            </p:txBody>
-          </p:sp>
-          <p:sp>
-            <p:nvSpPr>
-              <p:cNvPr id="31" name="TextBox 30">
-                <a:extLst>
-                  <a:ext uri="{FF2B5EF4-FFF2-40B4-BE49-F238E27FC236}">
-                    <a16:creationId xmlns:a16="http://schemas.microsoft.com/office/drawing/2014/main" id="{2B3478AC-77F5-4286-86D9-54230B203582}"/>
-                  </a:ext>
-                </a:extLst>
-              </p:cNvPr>
-              <p:cNvSpPr txBox="1"/>
-              <p:nvPr/>
-            </p:nvSpPr>
-            <p:spPr>
-              <a:xfrm>
-                <a:off x="7154752" y="598145"/>
-                <a:ext cx="1169016" cy="461665"/>
-              </a:xfrm>
-              <a:prstGeom prst="rect">
-                <a:avLst/>
-              </a:prstGeom>
-              <a:noFill/>
-            </p:spPr>
-            <p:txBody>
-              <a:bodyPr wrap="square" rtlCol="0">
-                <a:spAutoFit/>
-              </a:bodyPr>
-              <a:lstStyle/>
-              <a:p>
-                <a:r>
-                  <a:rPr lang="en-SG" sz="2400" dirty="0"/>
-                  <a:t>&gt;= 80%</a:t>
-                </a:r>
-              </a:p>
-            </p:txBody>
-          </p:sp>
-          <p:sp>
-            <p:nvSpPr>
-              <p:cNvPr id="32" name="TextBox 31">
-                <a:extLst>
-                  <a:ext uri="{FF2B5EF4-FFF2-40B4-BE49-F238E27FC236}">
-                    <a16:creationId xmlns:a16="http://schemas.microsoft.com/office/drawing/2014/main" id="{39996EB7-953D-4590-8E81-68B8B4BE1B44}"/>
-                  </a:ext>
-                </a:extLst>
-              </p:cNvPr>
-              <p:cNvSpPr txBox="1"/>
-              <p:nvPr/>
-            </p:nvSpPr>
-            <p:spPr>
-              <a:xfrm>
-                <a:off x="5893722" y="2761334"/>
-                <a:ext cx="963185" cy="461665"/>
-              </a:xfrm>
-              <a:prstGeom prst="rect">
-                <a:avLst/>
-              </a:prstGeom>
-              <a:noFill/>
-            </p:spPr>
-            <p:txBody>
-              <a:bodyPr wrap="square" rtlCol="0">
-                <a:spAutoFit/>
-              </a:bodyPr>
-              <a:lstStyle/>
-              <a:p>
-                <a:r>
-                  <a:rPr lang="en-SG" sz="2400" dirty="0"/>
-                  <a:t>&lt; 0.05</a:t>
-                </a:r>
-              </a:p>
-            </p:txBody>
-          </p:sp>
-          <p:sp>
-            <p:nvSpPr>
-              <p:cNvPr id="33" name="TextBox 32">
-                <a:extLst>
-                  <a:ext uri="{FF2B5EF4-FFF2-40B4-BE49-F238E27FC236}">
-                    <a16:creationId xmlns:a16="http://schemas.microsoft.com/office/drawing/2014/main" id="{0278EEC0-3C90-4166-891E-2634327A1EDB}"/>
-                  </a:ext>
-                </a:extLst>
-              </p:cNvPr>
-              <p:cNvSpPr txBox="1"/>
-              <p:nvPr/>
-            </p:nvSpPr>
-            <p:spPr>
-              <a:xfrm>
-                <a:off x="4755743" y="1615536"/>
-                <a:ext cx="963185" cy="461665"/>
-              </a:xfrm>
-              <a:prstGeom prst="rect">
-                <a:avLst/>
-              </a:prstGeom>
-              <a:noFill/>
-            </p:spPr>
-            <p:txBody>
-              <a:bodyPr wrap="square" rtlCol="0">
-                <a:spAutoFit/>
-              </a:bodyPr>
-              <a:lstStyle/>
-              <a:p>
-                <a:r>
-                  <a:rPr lang="en-SG" sz="2400" dirty="0"/>
-                  <a:t>&lt; 80%</a:t>
-                </a:r>
-              </a:p>
-            </p:txBody>
-          </p:sp>
-          <p:sp>
-            <p:nvSpPr>
-              <p:cNvPr id="34" name="TextBox 33">
-                <a:extLst>
-                  <a:ext uri="{FF2B5EF4-FFF2-40B4-BE49-F238E27FC236}">
-                    <a16:creationId xmlns:a16="http://schemas.microsoft.com/office/drawing/2014/main" id="{52DCE45D-DAA8-4844-BBF7-C7309E4B130B}"/>
-                  </a:ext>
-                </a:extLst>
-              </p:cNvPr>
-              <p:cNvSpPr txBox="1"/>
-              <p:nvPr/>
-            </p:nvSpPr>
-            <p:spPr>
-              <a:xfrm>
-                <a:off x="4630974" y="3566244"/>
-                <a:ext cx="1222172" cy="461665"/>
-              </a:xfrm>
-              <a:prstGeom prst="rect">
-                <a:avLst/>
-              </a:prstGeom>
-              <a:noFill/>
-            </p:spPr>
-            <p:txBody>
-              <a:bodyPr wrap="square" rtlCol="0">
-                <a:spAutoFit/>
-              </a:bodyPr>
-              <a:lstStyle/>
-              <a:p>
-                <a:r>
-                  <a:rPr lang="en-SG" sz="2400" dirty="0"/>
-                  <a:t>&gt;= 0.05</a:t>
-                </a:r>
-              </a:p>
-            </p:txBody>
-          </p:sp>
-          <p:sp>
-            <p:nvSpPr>
-              <p:cNvPr id="35" name="TextBox 34">
-                <a:extLst>
-                  <a:ext uri="{FF2B5EF4-FFF2-40B4-BE49-F238E27FC236}">
-                    <a16:creationId xmlns:a16="http://schemas.microsoft.com/office/drawing/2014/main" id="{B2025F16-CC59-4045-B8AA-7AAF14B9BC48}"/>
-                  </a:ext>
-                </a:extLst>
-              </p:cNvPr>
-              <p:cNvSpPr txBox="1"/>
-              <p:nvPr/>
-            </p:nvSpPr>
-            <p:spPr>
-              <a:xfrm>
-                <a:off x="8381077" y="3479574"/>
-                <a:ext cx="704479" cy="461665"/>
-              </a:xfrm>
-              <a:prstGeom prst="rect">
-                <a:avLst/>
-              </a:prstGeom>
-              <a:noFill/>
-            </p:spPr>
-            <p:txBody>
-              <a:bodyPr wrap="square" rtlCol="0">
-                <a:spAutoFit/>
-              </a:bodyPr>
-              <a:lstStyle/>
-              <a:p>
-                <a:r>
-                  <a:rPr lang="en-SG" sz="2400" dirty="0" err="1"/>
-                  <a:t>Pos</a:t>
-                </a:r>
-                <a:endParaRPr lang="en-SG" sz="2400" dirty="0"/>
-              </a:p>
-            </p:txBody>
-          </p:sp>
-          <p:sp>
-            <p:nvSpPr>
-              <p:cNvPr id="36" name="TextBox 35">
-                <a:extLst>
-                  <a:ext uri="{FF2B5EF4-FFF2-40B4-BE49-F238E27FC236}">
-                    <a16:creationId xmlns:a16="http://schemas.microsoft.com/office/drawing/2014/main" id="{94D1E9DD-A5F7-4F5D-8651-11E56D347D82}"/>
-                  </a:ext>
-                </a:extLst>
-              </p:cNvPr>
-              <p:cNvSpPr txBox="1"/>
-              <p:nvPr/>
-            </p:nvSpPr>
-            <p:spPr>
-              <a:xfrm>
-                <a:off x="8352698" y="1600103"/>
-                <a:ext cx="723333" cy="461665"/>
-              </a:xfrm>
-              <a:prstGeom prst="rect">
-                <a:avLst/>
-              </a:prstGeom>
-              <a:noFill/>
-            </p:spPr>
-            <p:txBody>
-              <a:bodyPr wrap="square" rtlCol="0">
-                <a:spAutoFit/>
-              </a:bodyPr>
-              <a:lstStyle/>
-              <a:p>
-                <a:pPr algn="ctr"/>
-                <a:r>
-                  <a:rPr lang="en-SG" sz="2400" dirty="0"/>
-                  <a:t>Neg</a:t>
-                </a:r>
-              </a:p>
-            </p:txBody>
-          </p:sp>
-          <p:cxnSp>
-            <p:nvCxnSpPr>
-              <p:cNvPr id="37" name="Connector: Elbow 36">
-                <a:extLst>
-                  <a:ext uri="{FF2B5EF4-FFF2-40B4-BE49-F238E27FC236}">
-                    <a16:creationId xmlns:a16="http://schemas.microsoft.com/office/drawing/2014/main" id="{09250787-EAD0-4B4E-AF03-E61488E35CE2}"/>
-                  </a:ext>
-                </a:extLst>
-              </p:cNvPr>
-              <p:cNvCxnSpPr>
-                <a:cxnSpLocks/>
-                <a:stCxn id="20" idx="2"/>
-                <a:endCxn id="25" idx="1"/>
-              </p:cNvCxnSpPr>
-              <p:nvPr/>
-            </p:nvCxnSpPr>
-            <p:spPr>
-              <a:xfrm rot="16200000" flipH="1">
-                <a:off x="6484306" y="1344822"/>
-                <a:ext cx="1340891" cy="5075121"/>
-              </a:xfrm>
-              <a:prstGeom prst="bentConnector2">
-                <a:avLst/>
-              </a:prstGeom>
-              <a:ln w="38100">
-                <a:solidFill>
-                  <a:srgbClr val="7030A0"/>
-                </a:solidFill>
-                <a:tailEnd type="triangle"/>
-              </a:ln>
-            </p:spPr>
-            <p:style>
-              <a:lnRef idx="1">
-                <a:schemeClr val="accent1"/>
-              </a:lnRef>
-              <a:fillRef idx="0">
-                <a:schemeClr val="accent1"/>
-              </a:fillRef>
-              <a:effectRef idx="0">
-                <a:schemeClr val="accent1"/>
-              </a:effectRef>
-              <a:fontRef idx="minor">
-                <a:schemeClr val="tx1"/>
-              </a:fontRef>
-            </p:style>
-          </p:cxnSp>
-          <p:cxnSp>
-            <p:nvCxnSpPr>
-              <p:cNvPr id="38" name="Connector: Elbow 37">
-                <a:extLst>
-                  <a:ext uri="{FF2B5EF4-FFF2-40B4-BE49-F238E27FC236}">
-                    <a16:creationId xmlns:a16="http://schemas.microsoft.com/office/drawing/2014/main" id="{5BEF1923-5DC3-4F0C-AFD5-03B6E6B453A3}"/>
-                  </a:ext>
-                </a:extLst>
-              </p:cNvPr>
-              <p:cNvCxnSpPr>
-                <a:cxnSpLocks/>
-                <a:stCxn id="39" idx="2"/>
-                <a:endCxn id="25" idx="1"/>
-              </p:cNvCxnSpPr>
-              <p:nvPr/>
-            </p:nvCxnSpPr>
-            <p:spPr>
-              <a:xfrm rot="16200000" flipH="1">
-                <a:off x="3970353" y="-1169131"/>
-                <a:ext cx="3122169" cy="8321750"/>
-              </a:xfrm>
-              <a:prstGeom prst="bentConnector2">
-                <a:avLst/>
-              </a:prstGeom>
-              <a:ln w="38100">
-                <a:solidFill>
-                  <a:srgbClr val="7030A0"/>
-                </a:solidFill>
-                <a:tailEnd type="triangle"/>
-              </a:ln>
-            </p:spPr>
-            <p:style>
-              <a:lnRef idx="1">
-                <a:schemeClr val="accent1"/>
-              </a:lnRef>
-              <a:fillRef idx="0">
-                <a:schemeClr val="accent1"/>
-              </a:fillRef>
-              <a:effectRef idx="0">
-                <a:schemeClr val="accent1"/>
-              </a:effectRef>
-              <a:fontRef idx="minor">
-                <a:schemeClr val="tx1"/>
-              </a:fontRef>
-            </p:style>
-          </p:cxnSp>
-          <p:sp>
-            <p:nvSpPr>
-              <p:cNvPr id="39" name="Rectangle 38">
-                <a:extLst>
-                  <a:ext uri="{FF2B5EF4-FFF2-40B4-BE49-F238E27FC236}">
-                    <a16:creationId xmlns:a16="http://schemas.microsoft.com/office/drawing/2014/main" id="{ED570DCA-CF59-4D8B-AB99-53DC8230208D}"/>
-                  </a:ext>
-                </a:extLst>
-              </p:cNvPr>
-              <p:cNvSpPr/>
-              <p:nvPr/>
-            </p:nvSpPr>
-            <p:spPr>
-              <a:xfrm>
-                <a:off x="354561" y="699139"/>
-                <a:ext cx="2032001" cy="731521"/>
-              </a:xfrm>
-              <a:prstGeom prst="rect">
-                <a:avLst/>
-              </a:prstGeom>
-              <a:solidFill>
-                <a:srgbClr val="CCFFFF"/>
-              </a:solidFill>
-              <a:ln>
-                <a:solidFill>
-                  <a:srgbClr val="000000"/>
-                </a:solidFill>
-              </a:ln>
-            </p:spPr>
-            <p:style>
-              <a:lnRef idx="2">
-                <a:schemeClr val="accent1">
-                  <a:shade val="50000"/>
-                </a:schemeClr>
-              </a:lnRef>
-              <a:fillRef idx="1">
-                <a:schemeClr val="accent1"/>
-              </a:fillRef>
-              <a:effectRef idx="0">
-                <a:schemeClr val="accent1"/>
-              </a:effectRef>
-              <a:fontRef idx="minor">
-                <a:schemeClr val="lt1"/>
-              </a:fontRef>
-            </p:style>
-            <p:txBody>
-              <a:bodyPr rtlCol="0" anchor="ctr"/>
-              <a:lstStyle/>
-              <a:p>
-                <a:pPr algn="ctr"/>
-                <a:r>
-                  <a:rPr lang="en-SG" sz="2400" dirty="0">
-                    <a:solidFill>
-                      <a:schemeClr val="tx1"/>
-                    </a:solidFill>
-                  </a:rPr>
-                  <a:t>Correlation Coefficient (R)</a:t>
-                </a:r>
-              </a:p>
-            </p:txBody>
-          </p:sp>
-          <p:cxnSp>
-            <p:nvCxnSpPr>
-              <p:cNvPr id="40" name="Connector: Elbow 39">
-                <a:extLst>
-                  <a:ext uri="{FF2B5EF4-FFF2-40B4-BE49-F238E27FC236}">
-                    <a16:creationId xmlns:a16="http://schemas.microsoft.com/office/drawing/2014/main" id="{E132AE54-0BC1-41F1-832F-6346AE4BD369}"/>
-                  </a:ext>
-                </a:extLst>
-              </p:cNvPr>
-              <p:cNvCxnSpPr>
-                <a:cxnSpLocks/>
-                <a:stCxn id="21" idx="0"/>
-                <a:endCxn id="22" idx="1"/>
-              </p:cNvCxnSpPr>
-              <p:nvPr/>
-            </p:nvCxnSpPr>
-            <p:spPr>
-              <a:xfrm rot="5400000" flipH="1" flipV="1">
-                <a:off x="8641643" y="1295106"/>
-                <a:ext cx="302919" cy="1817280"/>
-              </a:xfrm>
-              <a:prstGeom prst="bentConnector2">
-                <a:avLst/>
-              </a:prstGeom>
-              <a:ln w="38100">
-                <a:solidFill>
-                  <a:schemeClr val="accent6">
-                    <a:lumMod val="50000"/>
-                  </a:schemeClr>
-                </a:solidFill>
-                <a:tailEnd type="triangle"/>
-              </a:ln>
-            </p:spPr>
-            <p:style>
-              <a:lnRef idx="1">
-                <a:schemeClr val="accent1"/>
-              </a:lnRef>
-              <a:fillRef idx="0">
-                <a:schemeClr val="accent1"/>
-              </a:fillRef>
-              <a:effectRef idx="0">
-                <a:schemeClr val="accent1"/>
-              </a:effectRef>
-              <a:fontRef idx="minor">
-                <a:schemeClr val="tx1"/>
-              </a:fontRef>
-            </p:style>
-          </p:cxnSp>
-          <p:cxnSp>
-            <p:nvCxnSpPr>
-              <p:cNvPr id="41" name="Connector: Elbow 40">
-                <a:extLst>
-                  <a:ext uri="{FF2B5EF4-FFF2-40B4-BE49-F238E27FC236}">
-                    <a16:creationId xmlns:a16="http://schemas.microsoft.com/office/drawing/2014/main" id="{6CAA484A-79E0-434C-BA27-AFEE7783B2CD}"/>
-                  </a:ext>
-                </a:extLst>
-              </p:cNvPr>
-              <p:cNvCxnSpPr>
-                <a:cxnSpLocks/>
-                <a:stCxn id="21" idx="2"/>
-                <a:endCxn id="24" idx="1"/>
-              </p:cNvCxnSpPr>
-              <p:nvPr/>
-            </p:nvCxnSpPr>
-            <p:spPr>
-              <a:xfrm rot="16200000" flipH="1">
-                <a:off x="8629892" y="2466507"/>
-                <a:ext cx="316988" cy="1807848"/>
-              </a:xfrm>
-              <a:prstGeom prst="bentConnector2">
-                <a:avLst/>
-              </a:prstGeom>
-              <a:ln w="38100">
-                <a:solidFill>
-                  <a:schemeClr val="accent6">
-                    <a:lumMod val="50000"/>
-                  </a:schemeClr>
-                </a:solidFill>
-                <a:tailEnd type="triangle"/>
-              </a:ln>
-            </p:spPr>
-            <p:style>
-              <a:lnRef idx="1">
-                <a:schemeClr val="accent1"/>
-              </a:lnRef>
-              <a:fillRef idx="0">
-                <a:schemeClr val="accent1"/>
-              </a:fillRef>
-              <a:effectRef idx="0">
-                <a:schemeClr val="accent1"/>
-              </a:effectRef>
-              <a:fontRef idx="minor">
-                <a:schemeClr val="tx1"/>
-              </a:fontRef>
-            </p:style>
-          </p:cxnSp>
-        </p:grpSp>
-        <p:sp>
-          <p:nvSpPr>
-            <p:cNvPr id="57" name="Rectangle 56">
-              <a:extLst>
-                <a:ext uri="{FF2B5EF4-FFF2-40B4-BE49-F238E27FC236}">
-                  <a16:creationId xmlns:a16="http://schemas.microsoft.com/office/drawing/2014/main" id="{BA79DAB9-875B-4545-AE5F-F6E394D3EAAF}"/>
-                </a:ext>
-              </a:extLst>
-            </p:cNvPr>
-            <p:cNvSpPr/>
-            <p:nvPr/>
-          </p:nvSpPr>
-          <p:spPr>
-            <a:xfrm>
-              <a:off x="404668" y="-706139"/>
-              <a:ext cx="2090213" cy="584775"/>
-            </a:xfrm>
-            <a:prstGeom prst="rect">
-              <a:avLst/>
-            </a:prstGeom>
-          </p:spPr>
-          <p:txBody>
-            <a:bodyPr wrap="square">
-              <a:spAutoFit/>
-            </a:bodyPr>
-            <a:lstStyle/>
-            <a:p>
-              <a:r>
-                <a:rPr lang="en-SG" sz="3200" dirty="0"/>
-                <a:t>Workflow 1</a:t>
-              </a:r>
-            </a:p>
-          </p:txBody>
-        </p:sp>
-        <p:sp>
-          <p:nvSpPr>
-            <p:cNvPr id="58" name="Rectangle 57">
-              <a:extLst>
-                <a:ext uri="{FF2B5EF4-FFF2-40B4-BE49-F238E27FC236}">
-                  <a16:creationId xmlns:a16="http://schemas.microsoft.com/office/drawing/2014/main" id="{EA73D0B5-79F8-43E3-9ACE-E6B226507905}"/>
-                </a:ext>
-              </a:extLst>
-            </p:cNvPr>
-            <p:cNvSpPr/>
-            <p:nvPr/>
-          </p:nvSpPr>
-          <p:spPr>
-            <a:xfrm>
-              <a:off x="404668" y="1768346"/>
-              <a:ext cx="2090213" cy="584775"/>
-            </a:xfrm>
-            <a:prstGeom prst="rect">
-              <a:avLst/>
-            </a:prstGeom>
-          </p:spPr>
-          <p:txBody>
-            <a:bodyPr wrap="square">
-              <a:spAutoFit/>
-            </a:bodyPr>
-            <a:lstStyle/>
-            <a:p>
-              <a:r>
-                <a:rPr lang="en-SG" sz="3200" dirty="0"/>
-                <a:t>Workflow 2</a:t>
-              </a:r>
-            </a:p>
-          </p:txBody>
-        </p:sp>
-      </p:grpSp>
-    </p:spTree>
-    <p:extLst>
-      <p:ext uri="{BB962C8B-B14F-4D97-AF65-F5344CB8AC3E}">
-        <p14:creationId xmlns:p14="http://schemas.microsoft.com/office/powerpoint/2010/main" val="3374697378"/>
-      </p:ext>
-    </p:extLst>
-  </p:cSld>
-  <p:clrMapOvr>
-    <a:masterClrMapping/>
-  </p:clrMapOvr>
-</p:sld>
-</file>
-
-<file path=ppt/slides/slide11.xml><?xml version="1.0" encoding="utf-8"?>
 <p:sld xmlns:a="http://schemas.openxmlformats.org/drawingml/2006/main" xmlns:r="http://schemas.openxmlformats.org/officeDocument/2006/relationships" xmlns:p="http://schemas.openxmlformats.org/presentationml/2006/main">
   <p:cSld>
     <p:spTree>
@@ -11854,7 +9955,7 @@
 </p:sld>
 </file>
 
-<file path=ppt/slides/slide12.xml><?xml version="1.0" encoding="utf-8"?>
+<file path=ppt/slides/slide11.xml><?xml version="1.0" encoding="utf-8"?>
 <p:sld xmlns:a="http://schemas.openxmlformats.org/drawingml/2006/main" xmlns:r="http://schemas.openxmlformats.org/officeDocument/2006/relationships" xmlns:p="http://schemas.openxmlformats.org/presentationml/2006/main">
   <p:cSld>
     <p:spTree>
@@ -11920,7 +10021,7 @@
 </p:sld>
 </file>
 
-<file path=ppt/slides/slide13.xml><?xml version="1.0" encoding="utf-8"?>
+<file path=ppt/slides/slide12.xml><?xml version="1.0" encoding="utf-8"?>
 <p:sld xmlns:a="http://schemas.openxmlformats.org/drawingml/2006/main" xmlns:r="http://schemas.openxmlformats.org/officeDocument/2006/relationships" xmlns:p="http://schemas.openxmlformats.org/presentationml/2006/main">
   <p:cSld>
     <p:spTree>
@@ -18460,7 +16561,7 @@
 </p:sld>
 </file>
 
-<file path=ppt/slides/slide14.xml><?xml version="1.0" encoding="utf-8"?>
+<file path=ppt/slides/slide13.xml><?xml version="1.0" encoding="utf-8"?>
 <p:sld xmlns:a="http://schemas.openxmlformats.org/drawingml/2006/main" xmlns:r="http://schemas.openxmlformats.org/officeDocument/2006/relationships" xmlns:p="http://schemas.openxmlformats.org/presentationml/2006/main">
   <p:cSld>
     <p:spTree>
@@ -24809,217 +22910,6 @@
           <a:chExt cx="0" cy="0"/>
         </a:xfrm>
       </p:grpSpPr>
-      <p:grpSp>
-        <p:nvGrpSpPr>
-          <p:cNvPr id="13" name="Group 12">
-            <a:extLst>
-              <a:ext uri="{FF2B5EF4-FFF2-40B4-BE49-F238E27FC236}">
-                <a16:creationId xmlns:a16="http://schemas.microsoft.com/office/drawing/2014/main" id="{DB0DBFF1-FA6D-4BF3-A73A-F754FB19EBE1}"/>
-              </a:ext>
-            </a:extLst>
-          </p:cNvPr>
-          <p:cNvGrpSpPr/>
-          <p:nvPr/>
-        </p:nvGrpSpPr>
-        <p:grpSpPr>
-          <a:xfrm>
-            <a:off x="1602272" y="-193361"/>
-            <a:ext cx="9829800" cy="9619079"/>
-            <a:chOff x="1602272" y="-193361"/>
-            <a:chExt cx="9829800" cy="9619079"/>
-          </a:xfrm>
-        </p:grpSpPr>
-        <p:pic>
-          <p:nvPicPr>
-            <p:cNvPr id="7" name="Picture 6">
-              <a:extLst>
-                <a:ext uri="{FF2B5EF4-FFF2-40B4-BE49-F238E27FC236}">
-                  <a16:creationId xmlns:a16="http://schemas.microsoft.com/office/drawing/2014/main" id="{0B99FDAC-32F2-44B5-9893-A1F197513180}"/>
-                </a:ext>
-              </a:extLst>
-            </p:cNvPr>
-            <p:cNvPicPr>
-              <a:picLocks noChangeAspect="1"/>
-            </p:cNvPicPr>
-            <p:nvPr/>
-          </p:nvPicPr>
-          <p:blipFill>
-            <a:blip r:embed="rId2"/>
-            <a:stretch>
-              <a:fillRect/>
-            </a:stretch>
-          </p:blipFill>
-          <p:spPr>
-            <a:xfrm>
-              <a:off x="1602272" y="-193361"/>
-              <a:ext cx="9829800" cy="2095500"/>
-            </a:xfrm>
-            <a:prstGeom prst="rect">
-              <a:avLst/>
-            </a:prstGeom>
-          </p:spPr>
-        </p:pic>
-        <p:sp>
-          <p:nvSpPr>
-            <p:cNvPr id="5" name="Rectangle 4">
-              <a:extLst>
-                <a:ext uri="{FF2B5EF4-FFF2-40B4-BE49-F238E27FC236}">
-                  <a16:creationId xmlns:a16="http://schemas.microsoft.com/office/drawing/2014/main" id="{62F12C4C-3986-49B3-A822-19E8DB481CF4}"/>
-                </a:ext>
-              </a:extLst>
-            </p:cNvPr>
-            <p:cNvSpPr/>
-            <p:nvPr/>
-          </p:nvSpPr>
-          <p:spPr>
-            <a:xfrm>
-              <a:off x="1602272" y="1373448"/>
-              <a:ext cx="1504270" cy="378733"/>
-            </a:xfrm>
-            <a:prstGeom prst="rect">
-              <a:avLst/>
-            </a:prstGeom>
-            <a:noFill/>
-            <a:ln w="28575">
-              <a:solidFill>
-                <a:srgbClr val="0070C0"/>
-              </a:solidFill>
-            </a:ln>
-          </p:spPr>
-          <p:style>
-            <a:lnRef idx="2">
-              <a:schemeClr val="accent1">
-                <a:shade val="50000"/>
-              </a:schemeClr>
-            </a:lnRef>
-            <a:fillRef idx="1">
-              <a:schemeClr val="accent1"/>
-            </a:fillRef>
-            <a:effectRef idx="0">
-              <a:schemeClr val="accent1"/>
-            </a:effectRef>
-            <a:fontRef idx="minor">
-              <a:schemeClr val="lt1"/>
-            </a:fontRef>
-          </p:style>
-          <p:txBody>
-            <a:bodyPr rtlCol="0" anchor="ctr"/>
-            <a:lstStyle/>
-            <a:p>
-              <a:pPr algn="ctr"/>
-              <a:endParaRPr lang="en-SG" dirty="0"/>
-            </a:p>
-          </p:txBody>
-        </p:sp>
-        <p:cxnSp>
-          <p:nvCxnSpPr>
-            <p:cNvPr id="6" name="Connector: Elbow 5">
-              <a:extLst>
-                <a:ext uri="{FF2B5EF4-FFF2-40B4-BE49-F238E27FC236}">
-                  <a16:creationId xmlns:a16="http://schemas.microsoft.com/office/drawing/2014/main" id="{90721847-3904-47B7-B6C2-E6D633C9CFD0}"/>
-                </a:ext>
-              </a:extLst>
-            </p:cNvPr>
-            <p:cNvCxnSpPr>
-              <a:cxnSpLocks/>
-              <a:stCxn id="5" idx="2"/>
-              <a:endCxn id="9" idx="0"/>
-            </p:cNvCxnSpPr>
-            <p:nvPr/>
-          </p:nvCxnSpPr>
-          <p:spPr>
-            <a:xfrm rot="16200000" flipH="1">
-              <a:off x="4028021" y="78566"/>
-              <a:ext cx="815537" cy="4162765"/>
-            </a:xfrm>
-            <a:prstGeom prst="bentConnector3">
-              <a:avLst>
-                <a:gd name="adj1" fmla="val 50000"/>
-              </a:avLst>
-            </a:prstGeom>
-            <a:ln w="28575">
-              <a:solidFill>
-                <a:srgbClr val="0070C0"/>
-              </a:solidFill>
-              <a:tailEnd type="triangle"/>
-            </a:ln>
-          </p:spPr>
-          <p:style>
-            <a:lnRef idx="1">
-              <a:schemeClr val="accent1"/>
-            </a:lnRef>
-            <a:fillRef idx="0">
-              <a:schemeClr val="accent1"/>
-            </a:fillRef>
-            <a:effectRef idx="0">
-              <a:schemeClr val="accent1"/>
-            </a:effectRef>
-            <a:fontRef idx="minor">
-              <a:schemeClr val="tx1"/>
-            </a:fontRef>
-          </p:style>
-        </p:cxnSp>
-        <p:pic>
-          <p:nvPicPr>
-            <p:cNvPr id="9" name="Picture 8">
-              <a:extLst>
-                <a:ext uri="{FF2B5EF4-FFF2-40B4-BE49-F238E27FC236}">
-                  <a16:creationId xmlns:a16="http://schemas.microsoft.com/office/drawing/2014/main" id="{53A2AA47-3DAB-44B4-B959-95729D73C62F}"/>
-                </a:ext>
-              </a:extLst>
-            </p:cNvPr>
-            <p:cNvPicPr>
-              <a:picLocks noChangeAspect="1"/>
-            </p:cNvPicPr>
-            <p:nvPr/>
-          </p:nvPicPr>
-          <p:blipFill>
-            <a:blip r:embed="rId3"/>
-            <a:stretch>
-              <a:fillRect/>
-            </a:stretch>
-          </p:blipFill>
-          <p:spPr>
-            <a:xfrm>
-              <a:off x="1715149" y="2567718"/>
-              <a:ext cx="9604046" cy="6858000"/>
-            </a:xfrm>
-            <a:prstGeom prst="rect">
-              <a:avLst/>
-            </a:prstGeom>
-          </p:spPr>
-        </p:pic>
-      </p:grpSp>
-    </p:spTree>
-    <p:extLst>
-      <p:ext uri="{BB962C8B-B14F-4D97-AF65-F5344CB8AC3E}">
-        <p14:creationId xmlns:p14="http://schemas.microsoft.com/office/powerpoint/2010/main" val="1076340213"/>
-      </p:ext>
-    </p:extLst>
-  </p:cSld>
-  <p:clrMapOvr>
-    <a:masterClrMapping/>
-  </p:clrMapOvr>
-</p:sld>
-</file>
-
-<file path=ppt/slides/slide3.xml><?xml version="1.0" encoding="utf-8"?>
-<p:sld xmlns:a="http://schemas.openxmlformats.org/drawingml/2006/main" xmlns:r="http://schemas.openxmlformats.org/officeDocument/2006/relationships" xmlns:p="http://schemas.openxmlformats.org/presentationml/2006/main">
-  <p:cSld>
-    <p:spTree>
-      <p:nvGrpSpPr>
-        <p:cNvPr id="1" name=""/>
-        <p:cNvGrpSpPr/>
-        <p:nvPr/>
-      </p:nvGrpSpPr>
-      <p:grpSpPr>
-        <a:xfrm>
-          <a:off x="0" y="0"/>
-          <a:ext cx="0" cy="0"/>
-          <a:chOff x="0" y="0"/>
-          <a:chExt cx="0" cy="0"/>
-        </a:xfrm>
-      </p:grpSpPr>
       <p:cxnSp>
         <p:nvCxnSpPr>
           <p:cNvPr id="67" name="Straight Arrow Connector 66">
@@ -25237,7 +23127,7 @@
 </p:sld>
 </file>
 
-<file path=ppt/slides/slide4.xml><?xml version="1.0" encoding="utf-8"?>
+<file path=ppt/slides/slide3.xml><?xml version="1.0" encoding="utf-8"?>
 <p:sld xmlns:a="http://schemas.openxmlformats.org/drawingml/2006/main" xmlns:r="http://schemas.openxmlformats.org/officeDocument/2006/relationships" xmlns:p="http://schemas.openxmlformats.org/presentationml/2006/main">
   <p:cSld>
     <p:spTree>
@@ -25905,7 +23795,7 @@
 </p:sld>
 </file>
 
-<file path=ppt/slides/slide5.xml><?xml version="1.0" encoding="utf-8"?>
+<file path=ppt/slides/slide4.xml><?xml version="1.0" encoding="utf-8"?>
 <p:sld xmlns:a="http://schemas.openxmlformats.org/drawingml/2006/main" xmlns:r="http://schemas.openxmlformats.org/officeDocument/2006/relationships" xmlns:p="http://schemas.openxmlformats.org/presentationml/2006/main">
   <p:cSld>
     <p:spTree>
@@ -26535,7 +24425,7 @@
 </p:sld>
 </file>
 
-<file path=ppt/slides/slide6.xml><?xml version="1.0" encoding="utf-8"?>
+<file path=ppt/slides/slide5.xml><?xml version="1.0" encoding="utf-8"?>
 <p:sld xmlns:a="http://schemas.openxmlformats.org/drawingml/2006/main" xmlns:r="http://schemas.openxmlformats.org/officeDocument/2006/relationships" xmlns:p="http://schemas.openxmlformats.org/presentationml/2006/main">
   <p:cSld>
     <p:spTree>
@@ -27765,7 +25655,7 @@
 </p:sld>
 </file>
 
-<file path=ppt/slides/slide7.xml><?xml version="1.0" encoding="utf-8"?>
+<file path=ppt/slides/slide6.xml><?xml version="1.0" encoding="utf-8"?>
 <p:sld xmlns:a="http://schemas.openxmlformats.org/drawingml/2006/main" xmlns:r="http://schemas.openxmlformats.org/officeDocument/2006/relationships" xmlns:p="http://schemas.openxmlformats.org/presentationml/2006/main">
   <p:cSld>
     <p:spTree>
@@ -29663,7 +27553,7 @@
 </p:sld>
 </file>
 
-<file path=ppt/slides/slide8.xml><?xml version="1.0" encoding="utf-8"?>
+<file path=ppt/slides/slide7.xml><?xml version="1.0" encoding="utf-8"?>
 <p:sld xmlns:a="http://schemas.openxmlformats.org/drawingml/2006/main" xmlns:r="http://schemas.openxmlformats.org/officeDocument/2006/relationships" xmlns:p="http://schemas.openxmlformats.org/presentationml/2006/main">
   <p:cSld>
     <p:spTree>
@@ -31595,7 +29485,7 @@
 </p:sld>
 </file>
 
-<file path=ppt/slides/slide9.xml><?xml version="1.0" encoding="utf-8"?>
+<file path=ppt/slides/slide8.xml><?xml version="1.0" encoding="utf-8"?>
 <p:sld xmlns:a="http://schemas.openxmlformats.org/drawingml/2006/main" xmlns:r="http://schemas.openxmlformats.org/officeDocument/2006/relationships" xmlns:p="http://schemas.openxmlformats.org/presentationml/2006/main">
   <p:cSld>
     <p:spTree>
@@ -32825,6 +30715,1904 @@
 </p:sld>
 </file>
 
+<file path=ppt/slides/slide9.xml><?xml version="1.0" encoding="utf-8"?>
+<p:sld xmlns:a="http://schemas.openxmlformats.org/drawingml/2006/main" xmlns:r="http://schemas.openxmlformats.org/officeDocument/2006/relationships" xmlns:p="http://schemas.openxmlformats.org/presentationml/2006/main">
+  <p:cSld>
+    <p:spTree>
+      <p:nvGrpSpPr>
+        <p:cNvPr id="1" name=""/>
+        <p:cNvGrpSpPr/>
+        <p:nvPr/>
+      </p:nvGrpSpPr>
+      <p:grpSpPr>
+        <a:xfrm>
+          <a:off x="0" y="0"/>
+          <a:ext cx="0" cy="0"/>
+          <a:chOff x="0" y="0"/>
+          <a:chExt cx="0" cy="0"/>
+        </a:xfrm>
+      </p:grpSpPr>
+      <p:grpSp>
+        <p:nvGrpSpPr>
+          <p:cNvPr id="59" name="Group 58">
+            <a:extLst>
+              <a:ext uri="{FF2B5EF4-FFF2-40B4-BE49-F238E27FC236}">
+                <a16:creationId xmlns:a16="http://schemas.microsoft.com/office/drawing/2014/main" id="{1289F77F-F4C8-40F5-B1FD-BB1E15CF5E10}"/>
+              </a:ext>
+            </a:extLst>
+          </p:cNvPr>
+          <p:cNvGrpSpPr/>
+          <p:nvPr/>
+        </p:nvGrpSpPr>
+        <p:grpSpPr>
+          <a:xfrm>
+            <a:off x="404668" y="-706139"/>
+            <a:ext cx="11887884" cy="7554192"/>
+            <a:chOff x="404668" y="-706139"/>
+            <a:chExt cx="11832080" cy="7554192"/>
+          </a:xfrm>
+        </p:grpSpPr>
+        <p:sp>
+          <p:nvSpPr>
+            <p:cNvPr id="5" name="Rectangle 4">
+              <a:extLst>
+                <a:ext uri="{FF2B5EF4-FFF2-40B4-BE49-F238E27FC236}">
+                  <a16:creationId xmlns:a16="http://schemas.microsoft.com/office/drawing/2014/main" id="{C94C70DA-1A67-46D7-932D-06E67AB28A7F}"/>
+                </a:ext>
+              </a:extLst>
+            </p:cNvPr>
+            <p:cNvSpPr/>
+            <p:nvPr/>
+          </p:nvSpPr>
+          <p:spPr>
+            <a:xfrm>
+              <a:off x="406408" y="106827"/>
+              <a:ext cx="2032001" cy="709851"/>
+            </a:xfrm>
+            <a:prstGeom prst="rect">
+              <a:avLst/>
+            </a:prstGeom>
+            <a:solidFill>
+              <a:srgbClr val="CCFFFF"/>
+            </a:solidFill>
+            <a:ln>
+              <a:solidFill>
+                <a:srgbClr val="000000"/>
+              </a:solidFill>
+            </a:ln>
+          </p:spPr>
+          <p:style>
+            <a:lnRef idx="2">
+              <a:schemeClr val="accent1">
+                <a:shade val="50000"/>
+              </a:schemeClr>
+            </a:lnRef>
+            <a:fillRef idx="1">
+              <a:schemeClr val="accent1"/>
+            </a:fillRef>
+            <a:effectRef idx="0">
+              <a:schemeClr val="accent1"/>
+            </a:effectRef>
+            <a:fontRef idx="minor">
+              <a:schemeClr val="lt1"/>
+            </a:fontRef>
+          </p:style>
+          <p:txBody>
+            <a:bodyPr rtlCol="0" anchor="ctr"/>
+            <a:lstStyle/>
+            <a:p>
+              <a:pPr algn="ctr"/>
+              <a:r>
+                <a:rPr lang="en-SG" sz="2400" dirty="0">
+                  <a:solidFill>
+                    <a:schemeClr val="tx1"/>
+                  </a:solidFill>
+                </a:rPr>
+                <a:t>Correlation Coefficient (R)</a:t>
+              </a:r>
+            </a:p>
+          </p:txBody>
+        </p:sp>
+        <p:cxnSp>
+          <p:nvCxnSpPr>
+            <p:cNvPr id="6" name="Straight Arrow Connector 5">
+              <a:extLst>
+                <a:ext uri="{FF2B5EF4-FFF2-40B4-BE49-F238E27FC236}">
+                  <a16:creationId xmlns:a16="http://schemas.microsoft.com/office/drawing/2014/main" id="{1A31F963-1AE2-437D-9399-0704C188BB49}"/>
+                </a:ext>
+              </a:extLst>
+            </p:cNvPr>
+            <p:cNvCxnSpPr>
+              <a:cxnSpLocks/>
+              <a:stCxn id="5" idx="3"/>
+              <a:endCxn id="7" idx="1"/>
+            </p:cNvCxnSpPr>
+            <p:nvPr/>
+          </p:nvCxnSpPr>
+          <p:spPr>
+            <a:xfrm flipV="1">
+              <a:off x="2438409" y="458823"/>
+              <a:ext cx="1032887" cy="2930"/>
+            </a:xfrm>
+            <a:prstGeom prst="straightConnector1">
+              <a:avLst/>
+            </a:prstGeom>
+            <a:ln w="38100">
+              <a:solidFill>
+                <a:srgbClr val="99CC00"/>
+              </a:solidFill>
+              <a:tailEnd type="triangle"/>
+            </a:ln>
+          </p:spPr>
+          <p:style>
+            <a:lnRef idx="1">
+              <a:schemeClr val="accent1"/>
+            </a:lnRef>
+            <a:fillRef idx="0">
+              <a:schemeClr val="accent1"/>
+            </a:fillRef>
+            <a:effectRef idx="0">
+              <a:schemeClr val="accent1"/>
+            </a:effectRef>
+            <a:fontRef idx="minor">
+              <a:schemeClr val="tx1"/>
+            </a:fontRef>
+          </p:style>
+        </p:cxnSp>
+        <p:sp>
+          <p:nvSpPr>
+            <p:cNvPr id="7" name="Rectangle 6">
+              <a:extLst>
+                <a:ext uri="{FF2B5EF4-FFF2-40B4-BE49-F238E27FC236}">
+                  <a16:creationId xmlns:a16="http://schemas.microsoft.com/office/drawing/2014/main" id="{8BE3A876-D4B8-4811-B4C2-B6803DAE98A3}"/>
+                </a:ext>
+              </a:extLst>
+            </p:cNvPr>
+            <p:cNvSpPr/>
+            <p:nvPr/>
+          </p:nvSpPr>
+          <p:spPr>
+            <a:xfrm>
+              <a:off x="3471296" y="93062"/>
+              <a:ext cx="2474274" cy="731521"/>
+            </a:xfrm>
+            <a:prstGeom prst="rect">
+              <a:avLst/>
+            </a:prstGeom>
+            <a:solidFill>
+              <a:srgbClr val="CCFFFF"/>
+            </a:solidFill>
+            <a:ln>
+              <a:solidFill>
+                <a:srgbClr val="000000"/>
+              </a:solidFill>
+            </a:ln>
+          </p:spPr>
+          <p:style>
+            <a:lnRef idx="2">
+              <a:schemeClr val="accent1">
+                <a:shade val="50000"/>
+              </a:schemeClr>
+            </a:lnRef>
+            <a:fillRef idx="1">
+              <a:schemeClr val="accent1"/>
+            </a:fillRef>
+            <a:effectRef idx="0">
+              <a:schemeClr val="accent1"/>
+            </a:effectRef>
+            <a:fontRef idx="minor">
+              <a:schemeClr val="lt1"/>
+            </a:fontRef>
+          </p:style>
+          <p:txBody>
+            <a:bodyPr rtlCol="0" anchor="ctr"/>
+            <a:lstStyle/>
+            <a:p>
+              <a:pPr algn="ctr"/>
+              <a:r>
+                <a:rPr lang="en-US" sz="2400" dirty="0">
+                  <a:solidFill>
+                    <a:schemeClr val="tx1"/>
+                  </a:solidFill>
+                </a:rPr>
+                <a:t>Percent Residual Accuracy</a:t>
+              </a:r>
+              <a:endParaRPr lang="en-SG" sz="2400" dirty="0">
+                <a:solidFill>
+                  <a:schemeClr val="tx1"/>
+                </a:solidFill>
+              </a:endParaRPr>
+            </a:p>
+          </p:txBody>
+        </p:sp>
+        <p:sp>
+          <p:nvSpPr>
+            <p:cNvPr id="8" name="Rectangle 7">
+              <a:extLst>
+                <a:ext uri="{FF2B5EF4-FFF2-40B4-BE49-F238E27FC236}">
+                  <a16:creationId xmlns:a16="http://schemas.microsoft.com/office/drawing/2014/main" id="{1D4F2D49-FA5E-40F7-83A1-1F79F5637169}"/>
+                </a:ext>
+              </a:extLst>
+            </p:cNvPr>
+            <p:cNvSpPr/>
+            <p:nvPr/>
+          </p:nvSpPr>
+          <p:spPr>
+            <a:xfrm>
+              <a:off x="9753346" y="1088274"/>
+              <a:ext cx="2032001" cy="731521"/>
+            </a:xfrm>
+            <a:prstGeom prst="rect">
+              <a:avLst/>
+            </a:prstGeom>
+            <a:solidFill>
+              <a:schemeClr val="accent6">
+                <a:lumMod val="20000"/>
+                <a:lumOff val="80000"/>
+              </a:schemeClr>
+            </a:solidFill>
+            <a:ln>
+              <a:solidFill>
+                <a:srgbClr val="000000"/>
+              </a:solidFill>
+            </a:ln>
+          </p:spPr>
+          <p:style>
+            <a:lnRef idx="2">
+              <a:schemeClr val="accent1">
+                <a:shade val="50000"/>
+              </a:schemeClr>
+            </a:lnRef>
+            <a:fillRef idx="1">
+              <a:schemeClr val="accent1"/>
+            </a:fillRef>
+            <a:effectRef idx="0">
+              <a:schemeClr val="accent1"/>
+            </a:effectRef>
+            <a:fontRef idx="minor">
+              <a:schemeClr val="lt1"/>
+            </a:fontRef>
+          </p:style>
+          <p:txBody>
+            <a:bodyPr rtlCol="0" anchor="ctr"/>
+            <a:lstStyle/>
+            <a:p>
+              <a:pPr algn="ctr"/>
+              <a:r>
+                <a:rPr lang="en-SG" sz="2400" dirty="0">
+                  <a:solidFill>
+                    <a:schemeClr val="tx1"/>
+                  </a:solidFill>
+                </a:rPr>
+                <a:t>Poor Linearity</a:t>
+              </a:r>
+            </a:p>
+          </p:txBody>
+        </p:sp>
+        <p:sp>
+          <p:nvSpPr>
+            <p:cNvPr id="9" name="TextBox 8">
+              <a:extLst>
+                <a:ext uri="{FF2B5EF4-FFF2-40B4-BE49-F238E27FC236}">
+                  <a16:creationId xmlns:a16="http://schemas.microsoft.com/office/drawing/2014/main" id="{ABAE04C6-058F-45BB-A890-240C5AD2A1A6}"/>
+                </a:ext>
+              </a:extLst>
+            </p:cNvPr>
+            <p:cNvSpPr txBox="1"/>
+            <p:nvPr/>
+          </p:nvSpPr>
+          <p:spPr>
+            <a:xfrm>
+              <a:off x="2496621" y="40699"/>
+              <a:ext cx="1036397" cy="461665"/>
+            </a:xfrm>
+            <a:prstGeom prst="rect">
+              <a:avLst/>
+            </a:prstGeom>
+            <a:noFill/>
+          </p:spPr>
+          <p:txBody>
+            <a:bodyPr wrap="square" rtlCol="0">
+              <a:spAutoFit/>
+            </a:bodyPr>
+            <a:lstStyle/>
+            <a:p>
+              <a:r>
+                <a:rPr lang="en-SG" sz="2400" dirty="0"/>
+                <a:t>&gt;= 0.8</a:t>
+              </a:r>
+            </a:p>
+          </p:txBody>
+        </p:sp>
+        <p:sp>
+          <p:nvSpPr>
+            <p:cNvPr id="10" name="TextBox 9">
+              <a:extLst>
+                <a:ext uri="{FF2B5EF4-FFF2-40B4-BE49-F238E27FC236}">
+                  <a16:creationId xmlns:a16="http://schemas.microsoft.com/office/drawing/2014/main" id="{BA68A542-1BE7-4C68-B04E-1E04B5A297A9}"/>
+                </a:ext>
+              </a:extLst>
+            </p:cNvPr>
+            <p:cNvSpPr txBox="1"/>
+            <p:nvPr/>
+          </p:nvSpPr>
+          <p:spPr>
+            <a:xfrm>
+              <a:off x="1449775" y="904523"/>
+              <a:ext cx="933104" cy="461665"/>
+            </a:xfrm>
+            <a:prstGeom prst="rect">
+              <a:avLst/>
+            </a:prstGeom>
+            <a:noFill/>
+          </p:spPr>
+          <p:txBody>
+            <a:bodyPr wrap="square" rtlCol="0">
+              <a:spAutoFit/>
+            </a:bodyPr>
+            <a:lstStyle/>
+            <a:p>
+              <a:r>
+                <a:rPr lang="en-SG" sz="2400" dirty="0"/>
+                <a:t>&lt; 0.8</a:t>
+              </a:r>
+            </a:p>
+          </p:txBody>
+        </p:sp>
+        <p:sp>
+          <p:nvSpPr>
+            <p:cNvPr id="11" name="TextBox 10">
+              <a:extLst>
+                <a:ext uri="{FF2B5EF4-FFF2-40B4-BE49-F238E27FC236}">
+                  <a16:creationId xmlns:a16="http://schemas.microsoft.com/office/drawing/2014/main" id="{11F5E3E3-E70B-47EA-9734-1DC0620CC5DF}"/>
+                </a:ext>
+              </a:extLst>
+            </p:cNvPr>
+            <p:cNvSpPr txBox="1"/>
+            <p:nvPr/>
+          </p:nvSpPr>
+          <p:spPr>
+            <a:xfrm>
+              <a:off x="4720620" y="876946"/>
+              <a:ext cx="963185" cy="461665"/>
+            </a:xfrm>
+            <a:prstGeom prst="rect">
+              <a:avLst/>
+            </a:prstGeom>
+            <a:noFill/>
+          </p:spPr>
+          <p:txBody>
+            <a:bodyPr wrap="square" rtlCol="0">
+              <a:spAutoFit/>
+            </a:bodyPr>
+            <a:lstStyle/>
+            <a:p>
+              <a:r>
+                <a:rPr lang="en-SG" sz="2400" dirty="0"/>
+                <a:t>&lt; 80%</a:t>
+              </a:r>
+            </a:p>
+          </p:txBody>
+        </p:sp>
+        <p:sp>
+          <p:nvSpPr>
+            <p:cNvPr id="12" name="Rectangle 11">
+              <a:extLst>
+                <a:ext uri="{FF2B5EF4-FFF2-40B4-BE49-F238E27FC236}">
+                  <a16:creationId xmlns:a16="http://schemas.microsoft.com/office/drawing/2014/main" id="{6A56D423-EFB3-4C5E-8FE3-AE95F35C2275}"/>
+                </a:ext>
+              </a:extLst>
+            </p:cNvPr>
+            <p:cNvSpPr/>
+            <p:nvPr/>
+          </p:nvSpPr>
+          <p:spPr>
+            <a:xfrm>
+              <a:off x="9753346" y="79449"/>
+              <a:ext cx="2032001" cy="731521"/>
+            </a:xfrm>
+            <a:prstGeom prst="rect">
+              <a:avLst/>
+            </a:prstGeom>
+            <a:solidFill>
+              <a:schemeClr val="accent6">
+                <a:lumMod val="20000"/>
+                <a:lumOff val="80000"/>
+              </a:schemeClr>
+            </a:solidFill>
+            <a:ln>
+              <a:solidFill>
+                <a:srgbClr val="000000"/>
+              </a:solidFill>
+            </a:ln>
+          </p:spPr>
+          <p:style>
+            <a:lnRef idx="2">
+              <a:schemeClr val="accent1">
+                <a:shade val="50000"/>
+              </a:schemeClr>
+            </a:lnRef>
+            <a:fillRef idx="1">
+              <a:schemeClr val="accent1"/>
+            </a:fillRef>
+            <a:effectRef idx="0">
+              <a:schemeClr val="accent1"/>
+            </a:effectRef>
+            <a:fontRef idx="minor">
+              <a:schemeClr val="lt1"/>
+            </a:fontRef>
+          </p:style>
+          <p:txBody>
+            <a:bodyPr rtlCol="0" anchor="ctr"/>
+            <a:lstStyle/>
+            <a:p>
+              <a:pPr algn="ctr"/>
+              <a:r>
+                <a:rPr lang="en-SG" sz="2400" dirty="0">
+                  <a:solidFill>
+                    <a:schemeClr val="tx1"/>
+                  </a:solidFill>
+                </a:rPr>
+                <a:t>Good Linearity</a:t>
+              </a:r>
+            </a:p>
+          </p:txBody>
+        </p:sp>
+        <p:cxnSp>
+          <p:nvCxnSpPr>
+            <p:cNvPr id="13" name="Straight Arrow Connector 12">
+              <a:extLst>
+                <a:ext uri="{FF2B5EF4-FFF2-40B4-BE49-F238E27FC236}">
+                  <a16:creationId xmlns:a16="http://schemas.microsoft.com/office/drawing/2014/main" id="{5331DF66-0540-4727-ADFE-2C861ECAAD56}"/>
+                </a:ext>
+              </a:extLst>
+            </p:cNvPr>
+            <p:cNvCxnSpPr>
+              <a:cxnSpLocks/>
+              <a:stCxn id="7" idx="3"/>
+              <a:endCxn id="12" idx="1"/>
+            </p:cNvCxnSpPr>
+            <p:nvPr/>
+          </p:nvCxnSpPr>
+          <p:spPr>
+            <a:xfrm flipV="1">
+              <a:off x="5945570" y="445210"/>
+              <a:ext cx="3807776" cy="13613"/>
+            </a:xfrm>
+            <a:prstGeom prst="straightConnector1">
+              <a:avLst/>
+            </a:prstGeom>
+            <a:ln w="38100">
+              <a:solidFill>
+                <a:srgbClr val="99CC00"/>
+              </a:solidFill>
+              <a:tailEnd type="triangle"/>
+            </a:ln>
+          </p:spPr>
+          <p:style>
+            <a:lnRef idx="1">
+              <a:schemeClr val="accent1"/>
+            </a:lnRef>
+            <a:fillRef idx="0">
+              <a:schemeClr val="accent1"/>
+            </a:fillRef>
+            <a:effectRef idx="0">
+              <a:schemeClr val="accent1"/>
+            </a:effectRef>
+            <a:fontRef idx="minor">
+              <a:schemeClr val="tx1"/>
+            </a:fontRef>
+          </p:style>
+        </p:cxnSp>
+        <p:sp>
+          <p:nvSpPr>
+            <p:cNvPr id="14" name="TextBox 13">
+              <a:extLst>
+                <a:ext uri="{FF2B5EF4-FFF2-40B4-BE49-F238E27FC236}">
+                  <a16:creationId xmlns:a16="http://schemas.microsoft.com/office/drawing/2014/main" id="{21C29405-CF84-472A-B80F-262ECA405BBC}"/>
+                </a:ext>
+              </a:extLst>
+            </p:cNvPr>
+            <p:cNvSpPr txBox="1"/>
+            <p:nvPr/>
+          </p:nvSpPr>
+          <p:spPr>
+            <a:xfrm>
+              <a:off x="7206599" y="30886"/>
+              <a:ext cx="1169016" cy="461665"/>
+            </a:xfrm>
+            <a:prstGeom prst="rect">
+              <a:avLst/>
+            </a:prstGeom>
+            <a:noFill/>
+          </p:spPr>
+          <p:txBody>
+            <a:bodyPr wrap="square" rtlCol="0">
+              <a:spAutoFit/>
+            </a:bodyPr>
+            <a:lstStyle/>
+            <a:p>
+              <a:r>
+                <a:rPr lang="en-SG" sz="2400" dirty="0"/>
+                <a:t>&gt;= 80%</a:t>
+              </a:r>
+            </a:p>
+          </p:txBody>
+        </p:sp>
+        <p:cxnSp>
+          <p:nvCxnSpPr>
+            <p:cNvPr id="15" name="Connector: Elbow 14">
+              <a:extLst>
+                <a:ext uri="{FF2B5EF4-FFF2-40B4-BE49-F238E27FC236}">
+                  <a16:creationId xmlns:a16="http://schemas.microsoft.com/office/drawing/2014/main" id="{A902D536-916F-41F0-BAAF-EE3705BCDFBF}"/>
+                </a:ext>
+              </a:extLst>
+            </p:cNvPr>
+            <p:cNvCxnSpPr>
+              <a:cxnSpLocks/>
+              <a:stCxn id="7" idx="2"/>
+              <a:endCxn id="8" idx="1"/>
+            </p:cNvCxnSpPr>
+            <p:nvPr/>
+          </p:nvCxnSpPr>
+          <p:spPr>
+            <a:xfrm rot="16200000" flipH="1">
+              <a:off x="6916163" y="-1383148"/>
+              <a:ext cx="629452" cy="5044913"/>
+            </a:xfrm>
+            <a:prstGeom prst="bentConnector2">
+              <a:avLst/>
+            </a:prstGeom>
+            <a:ln w="38100">
+              <a:solidFill>
+                <a:srgbClr val="7030A0"/>
+              </a:solidFill>
+              <a:tailEnd type="triangle"/>
+            </a:ln>
+          </p:spPr>
+          <p:style>
+            <a:lnRef idx="1">
+              <a:schemeClr val="accent1"/>
+            </a:lnRef>
+            <a:fillRef idx="0">
+              <a:schemeClr val="accent1"/>
+            </a:fillRef>
+            <a:effectRef idx="0">
+              <a:schemeClr val="accent1"/>
+            </a:effectRef>
+            <a:fontRef idx="minor">
+              <a:schemeClr val="tx1"/>
+            </a:fontRef>
+          </p:style>
+        </p:cxnSp>
+        <p:cxnSp>
+          <p:nvCxnSpPr>
+            <p:cNvPr id="16" name="Connector: Elbow 15">
+              <a:extLst>
+                <a:ext uri="{FF2B5EF4-FFF2-40B4-BE49-F238E27FC236}">
+                  <a16:creationId xmlns:a16="http://schemas.microsoft.com/office/drawing/2014/main" id="{459CE4D0-7D29-42FB-8A0A-AE0724909B98}"/>
+                </a:ext>
+              </a:extLst>
+            </p:cNvPr>
+            <p:cNvCxnSpPr>
+              <a:cxnSpLocks/>
+              <a:stCxn id="5" idx="2"/>
+              <a:endCxn id="8" idx="1"/>
+            </p:cNvCxnSpPr>
+            <p:nvPr/>
+          </p:nvCxnSpPr>
+          <p:spPr>
+            <a:xfrm rot="16200000" flipH="1">
+              <a:off x="5269199" y="-3030113"/>
+              <a:ext cx="637357" cy="8330937"/>
+            </a:xfrm>
+            <a:prstGeom prst="bentConnector2">
+              <a:avLst/>
+            </a:prstGeom>
+            <a:ln w="38100">
+              <a:solidFill>
+                <a:srgbClr val="7030A0"/>
+              </a:solidFill>
+              <a:tailEnd type="triangle"/>
+            </a:ln>
+          </p:spPr>
+          <p:style>
+            <a:lnRef idx="1">
+              <a:schemeClr val="accent1"/>
+            </a:lnRef>
+            <a:fillRef idx="0">
+              <a:schemeClr val="accent1"/>
+            </a:fillRef>
+            <a:effectRef idx="0">
+              <a:schemeClr val="accent1"/>
+            </a:effectRef>
+            <a:fontRef idx="minor">
+              <a:schemeClr val="tx1"/>
+            </a:fontRef>
+          </p:style>
+        </p:cxnSp>
+        <p:grpSp>
+          <p:nvGrpSpPr>
+            <p:cNvPr id="17" name="Group 16">
+              <a:extLst>
+                <a:ext uri="{FF2B5EF4-FFF2-40B4-BE49-F238E27FC236}">
+                  <a16:creationId xmlns:a16="http://schemas.microsoft.com/office/drawing/2014/main" id="{75EDCE0F-7C6A-42E4-BA4D-88444DF2788D}"/>
+                </a:ext>
+              </a:extLst>
+            </p:cNvPr>
+            <p:cNvGrpSpPr/>
+            <p:nvPr/>
+          </p:nvGrpSpPr>
+          <p:grpSpPr>
+            <a:xfrm>
+              <a:off x="406409" y="2527609"/>
+              <a:ext cx="11830339" cy="4320444"/>
+              <a:chOff x="354561" y="598145"/>
+              <a:chExt cx="11830339" cy="4320444"/>
+            </a:xfrm>
+          </p:grpSpPr>
+          <p:cxnSp>
+            <p:nvCxnSpPr>
+              <p:cNvPr id="18" name="Straight Arrow Connector 17">
+                <a:extLst>
+                  <a:ext uri="{FF2B5EF4-FFF2-40B4-BE49-F238E27FC236}">
+                    <a16:creationId xmlns:a16="http://schemas.microsoft.com/office/drawing/2014/main" id="{51C1A874-29E6-447D-97DC-E718E4682AFE}"/>
+                  </a:ext>
+                </a:extLst>
+              </p:cNvPr>
+              <p:cNvCxnSpPr>
+                <a:cxnSpLocks/>
+                <a:stCxn id="39" idx="3"/>
+                <a:endCxn id="19" idx="1"/>
+              </p:cNvCxnSpPr>
+              <p:nvPr/>
+            </p:nvCxnSpPr>
+            <p:spPr>
+              <a:xfrm flipV="1">
+                <a:off x="2386562" y="1061582"/>
+                <a:ext cx="992310" cy="3318"/>
+              </a:xfrm>
+              <a:prstGeom prst="straightConnector1">
+                <a:avLst/>
+              </a:prstGeom>
+              <a:ln w="38100">
+                <a:solidFill>
+                  <a:srgbClr val="99CC00"/>
+                </a:solidFill>
+                <a:tailEnd type="triangle"/>
+              </a:ln>
+            </p:spPr>
+            <p:style>
+              <a:lnRef idx="1">
+                <a:schemeClr val="accent1"/>
+              </a:lnRef>
+              <a:fillRef idx="0">
+                <a:schemeClr val="accent1"/>
+              </a:fillRef>
+              <a:effectRef idx="0">
+                <a:schemeClr val="accent1"/>
+              </a:effectRef>
+              <a:fontRef idx="minor">
+                <a:schemeClr val="tx1"/>
+              </a:fontRef>
+            </p:style>
+          </p:cxnSp>
+          <p:sp>
+            <p:nvSpPr>
+              <p:cNvPr id="19" name="Rectangle 18">
+                <a:extLst>
+                  <a:ext uri="{FF2B5EF4-FFF2-40B4-BE49-F238E27FC236}">
+                    <a16:creationId xmlns:a16="http://schemas.microsoft.com/office/drawing/2014/main" id="{38CE6B07-8782-490D-BB4C-C04F6910642A}"/>
+                  </a:ext>
+                </a:extLst>
+              </p:cNvPr>
+              <p:cNvSpPr/>
+              <p:nvPr/>
+            </p:nvSpPr>
+            <p:spPr>
+              <a:xfrm>
+                <a:off x="3378872" y="695821"/>
+                <a:ext cx="2474274" cy="731521"/>
+              </a:xfrm>
+              <a:prstGeom prst="rect">
+                <a:avLst/>
+              </a:prstGeom>
+              <a:solidFill>
+                <a:srgbClr val="CCFFFF"/>
+              </a:solidFill>
+              <a:ln>
+                <a:solidFill>
+                  <a:srgbClr val="000000"/>
+                </a:solidFill>
+              </a:ln>
+            </p:spPr>
+            <p:style>
+              <a:lnRef idx="2">
+                <a:schemeClr val="accent1">
+                  <a:shade val="50000"/>
+                </a:schemeClr>
+              </a:lnRef>
+              <a:fillRef idx="1">
+                <a:schemeClr val="accent1"/>
+              </a:fillRef>
+              <a:effectRef idx="0">
+                <a:schemeClr val="accent1"/>
+              </a:effectRef>
+              <a:fontRef idx="minor">
+                <a:schemeClr val="lt1"/>
+              </a:fontRef>
+            </p:style>
+            <p:txBody>
+              <a:bodyPr rtlCol="0" anchor="ctr"/>
+              <a:lstStyle/>
+              <a:p>
+                <a:pPr algn="ctr"/>
+                <a:r>
+                  <a:rPr lang="en-US" sz="2400" dirty="0">
+                    <a:solidFill>
+                      <a:schemeClr val="tx1"/>
+                    </a:solidFill>
+                  </a:rPr>
+                  <a:t>Percent Residual Accuracy</a:t>
+                </a:r>
+                <a:endParaRPr lang="en-SG" sz="2400" dirty="0">
+                  <a:solidFill>
+                    <a:schemeClr val="tx1"/>
+                  </a:solidFill>
+                </a:endParaRPr>
+              </a:p>
+            </p:txBody>
+          </p:sp>
+          <p:sp>
+            <p:nvSpPr>
+              <p:cNvPr id="20" name="Rectangle 19">
+                <a:extLst>
+                  <a:ext uri="{FF2B5EF4-FFF2-40B4-BE49-F238E27FC236}">
+                    <a16:creationId xmlns:a16="http://schemas.microsoft.com/office/drawing/2014/main" id="{74FA55BF-DEFE-40E8-BD35-450D4F7EA69A}"/>
+                  </a:ext>
+                </a:extLst>
+              </p:cNvPr>
+              <p:cNvSpPr/>
+              <p:nvPr/>
+            </p:nvSpPr>
+            <p:spPr>
+              <a:xfrm>
+                <a:off x="3324674" y="2355205"/>
+                <a:ext cx="2585034" cy="856733"/>
+              </a:xfrm>
+              <a:prstGeom prst="rect">
+                <a:avLst/>
+              </a:prstGeom>
+              <a:solidFill>
+                <a:srgbClr val="CCFFFF"/>
+              </a:solidFill>
+              <a:ln>
+                <a:solidFill>
+                  <a:srgbClr val="000000"/>
+                </a:solidFill>
+              </a:ln>
+            </p:spPr>
+            <p:style>
+              <a:lnRef idx="2">
+                <a:schemeClr val="accent1">
+                  <a:shade val="50000"/>
+                </a:schemeClr>
+              </a:lnRef>
+              <a:fillRef idx="1">
+                <a:schemeClr val="accent1"/>
+              </a:fillRef>
+              <a:effectRef idx="0">
+                <a:schemeClr val="accent1"/>
+              </a:effectRef>
+              <a:fontRef idx="minor">
+                <a:schemeClr val="lt1"/>
+              </a:fontRef>
+            </p:style>
+            <p:txBody>
+              <a:bodyPr rtlCol="0" anchor="ctr"/>
+              <a:lstStyle/>
+              <a:p>
+                <a:pPr algn="ctr"/>
+                <a:r>
+                  <a:rPr lang="en-US" sz="2400" dirty="0">
+                    <a:solidFill>
+                      <a:schemeClr val="tx1"/>
+                    </a:solidFill>
+                  </a:rPr>
+                  <a:t>Mandel Fitting Test</a:t>
+                </a:r>
+              </a:p>
+              <a:p>
+                <a:pPr algn="ctr"/>
+                <a:r>
+                  <a:rPr lang="en-US" sz="2400" dirty="0">
+                    <a:solidFill>
+                      <a:schemeClr val="tx1"/>
+                    </a:solidFill>
+                  </a:rPr>
+                  <a:t>p value</a:t>
+                </a:r>
+                <a:endParaRPr lang="en-SG" sz="2400" dirty="0">
+                  <a:solidFill>
+                    <a:schemeClr val="tx1"/>
+                  </a:solidFill>
+                </a:endParaRPr>
+              </a:p>
+            </p:txBody>
+          </p:sp>
+          <p:sp>
+            <p:nvSpPr>
+              <p:cNvPr id="21" name="Rectangle 20">
+                <a:extLst>
+                  <a:ext uri="{FF2B5EF4-FFF2-40B4-BE49-F238E27FC236}">
+                    <a16:creationId xmlns:a16="http://schemas.microsoft.com/office/drawing/2014/main" id="{4A7D1205-C675-4653-95E9-4ECACCEE333D}"/>
+                  </a:ext>
+                </a:extLst>
+              </p:cNvPr>
+              <p:cNvSpPr/>
+              <p:nvPr/>
+            </p:nvSpPr>
+            <p:spPr>
+              <a:xfrm>
+                <a:off x="6868461" y="2355205"/>
+                <a:ext cx="2032001" cy="856733"/>
+              </a:xfrm>
+              <a:prstGeom prst="rect">
+                <a:avLst/>
+              </a:prstGeom>
+              <a:solidFill>
+                <a:srgbClr val="CCFFFF"/>
+              </a:solidFill>
+              <a:ln>
+                <a:solidFill>
+                  <a:srgbClr val="000000"/>
+                </a:solidFill>
+              </a:ln>
+            </p:spPr>
+            <p:style>
+              <a:lnRef idx="2">
+                <a:schemeClr val="accent1">
+                  <a:shade val="50000"/>
+                </a:schemeClr>
+              </a:lnRef>
+              <a:fillRef idx="1">
+                <a:schemeClr val="accent1"/>
+              </a:fillRef>
+              <a:effectRef idx="0">
+                <a:schemeClr val="accent1"/>
+              </a:effectRef>
+              <a:fontRef idx="minor">
+                <a:schemeClr val="lt1"/>
+              </a:fontRef>
+            </p:style>
+            <p:txBody>
+              <a:bodyPr rtlCol="0" anchor="ctr"/>
+              <a:lstStyle/>
+              <a:p>
+                <a:pPr algn="ctr"/>
+                <a:r>
+                  <a:rPr lang="en-SG" sz="2400" dirty="0">
+                    <a:solidFill>
+                      <a:schemeClr val="tx1"/>
+                    </a:solidFill>
+                  </a:rPr>
+                  <a:t>Concavity</a:t>
+                </a:r>
+              </a:p>
+            </p:txBody>
+          </p:sp>
+          <p:sp>
+            <p:nvSpPr>
+              <p:cNvPr id="22" name="Rectangle 21">
+                <a:extLst>
+                  <a:ext uri="{FF2B5EF4-FFF2-40B4-BE49-F238E27FC236}">
+                    <a16:creationId xmlns:a16="http://schemas.microsoft.com/office/drawing/2014/main" id="{B8241480-DD62-4F93-9F7B-FCCD8B061EA4}"/>
+                  </a:ext>
+                </a:extLst>
+              </p:cNvPr>
+              <p:cNvSpPr/>
+              <p:nvPr/>
+            </p:nvSpPr>
+            <p:spPr>
+              <a:xfrm>
+                <a:off x="9701742" y="1686525"/>
+                <a:ext cx="2483158" cy="731521"/>
+              </a:xfrm>
+              <a:prstGeom prst="rect">
+                <a:avLst/>
+              </a:prstGeom>
+              <a:solidFill>
+                <a:schemeClr val="accent6">
+                  <a:lumMod val="20000"/>
+                  <a:lumOff val="80000"/>
+                </a:schemeClr>
+              </a:solidFill>
+              <a:ln>
+                <a:solidFill>
+                  <a:srgbClr val="000000"/>
+                </a:solidFill>
+              </a:ln>
+            </p:spPr>
+            <p:style>
+              <a:lnRef idx="2">
+                <a:schemeClr val="accent1">
+                  <a:shade val="50000"/>
+                </a:schemeClr>
+              </a:lnRef>
+              <a:fillRef idx="1">
+                <a:schemeClr val="accent1"/>
+              </a:fillRef>
+              <a:effectRef idx="0">
+                <a:schemeClr val="accent1"/>
+              </a:effectRef>
+              <a:fontRef idx="minor">
+                <a:schemeClr val="lt1"/>
+              </a:fontRef>
+            </p:style>
+            <p:txBody>
+              <a:bodyPr rtlCol="0" anchor="ctr"/>
+              <a:lstStyle/>
+              <a:p>
+                <a:pPr algn="ctr"/>
+                <a:r>
+                  <a:rPr lang="en-SG" sz="2400" dirty="0">
+                    <a:solidFill>
+                      <a:schemeClr val="tx1"/>
+                    </a:solidFill>
+                  </a:rPr>
+                  <a:t>Saturation Regime</a:t>
+                </a:r>
+              </a:p>
+            </p:txBody>
+          </p:sp>
+          <p:sp>
+            <p:nvSpPr>
+              <p:cNvPr id="23" name="Rectangle 22">
+                <a:extLst>
+                  <a:ext uri="{FF2B5EF4-FFF2-40B4-BE49-F238E27FC236}">
+                    <a16:creationId xmlns:a16="http://schemas.microsoft.com/office/drawing/2014/main" id="{74F27443-DC4D-4146-88A6-BFE183E50C10}"/>
+                  </a:ext>
+                </a:extLst>
+              </p:cNvPr>
+              <p:cNvSpPr/>
+              <p:nvPr/>
+            </p:nvSpPr>
+            <p:spPr>
+              <a:xfrm>
+                <a:off x="9701742" y="694050"/>
+                <a:ext cx="2032001" cy="731521"/>
+              </a:xfrm>
+              <a:prstGeom prst="rect">
+                <a:avLst/>
+              </a:prstGeom>
+              <a:solidFill>
+                <a:schemeClr val="accent6">
+                  <a:lumMod val="20000"/>
+                  <a:lumOff val="80000"/>
+                </a:schemeClr>
+              </a:solidFill>
+              <a:ln>
+                <a:solidFill>
+                  <a:srgbClr val="000000"/>
+                </a:solidFill>
+              </a:ln>
+            </p:spPr>
+            <p:style>
+              <a:lnRef idx="2">
+                <a:schemeClr val="accent1">
+                  <a:shade val="50000"/>
+                </a:schemeClr>
+              </a:lnRef>
+              <a:fillRef idx="1">
+                <a:schemeClr val="accent1"/>
+              </a:fillRef>
+              <a:effectRef idx="0">
+                <a:schemeClr val="accent1"/>
+              </a:effectRef>
+              <a:fontRef idx="minor">
+                <a:schemeClr val="lt1"/>
+              </a:fontRef>
+            </p:style>
+            <p:txBody>
+              <a:bodyPr rtlCol="0" anchor="ctr"/>
+              <a:lstStyle/>
+              <a:p>
+                <a:pPr algn="ctr"/>
+                <a:r>
+                  <a:rPr lang="en-SG" sz="2400" dirty="0">
+                    <a:solidFill>
+                      <a:schemeClr val="tx1"/>
+                    </a:solidFill>
+                  </a:rPr>
+                  <a:t>Good Linearity</a:t>
+                </a:r>
+              </a:p>
+            </p:txBody>
+          </p:sp>
+          <p:sp>
+            <p:nvSpPr>
+              <p:cNvPr id="24" name="Rectangle 23">
+                <a:extLst>
+                  <a:ext uri="{FF2B5EF4-FFF2-40B4-BE49-F238E27FC236}">
+                    <a16:creationId xmlns:a16="http://schemas.microsoft.com/office/drawing/2014/main" id="{8864B739-D169-40D1-A91D-5177242DE18B}"/>
+                  </a:ext>
+                </a:extLst>
+              </p:cNvPr>
+              <p:cNvSpPr/>
+              <p:nvPr/>
+            </p:nvSpPr>
+            <p:spPr>
+              <a:xfrm>
+                <a:off x="9692311" y="3163165"/>
+                <a:ext cx="2041189" cy="731521"/>
+              </a:xfrm>
+              <a:prstGeom prst="rect">
+                <a:avLst/>
+              </a:prstGeom>
+              <a:solidFill>
+                <a:schemeClr val="accent6">
+                  <a:lumMod val="20000"/>
+                  <a:lumOff val="80000"/>
+                </a:schemeClr>
+              </a:solidFill>
+              <a:ln>
+                <a:solidFill>
+                  <a:srgbClr val="000000"/>
+                </a:solidFill>
+              </a:ln>
+            </p:spPr>
+            <p:style>
+              <a:lnRef idx="2">
+                <a:schemeClr val="accent1">
+                  <a:shade val="50000"/>
+                </a:schemeClr>
+              </a:lnRef>
+              <a:fillRef idx="1">
+                <a:schemeClr val="accent1"/>
+              </a:fillRef>
+              <a:effectRef idx="0">
+                <a:schemeClr val="accent1"/>
+              </a:effectRef>
+              <a:fontRef idx="minor">
+                <a:schemeClr val="lt1"/>
+              </a:fontRef>
+            </p:style>
+            <p:txBody>
+              <a:bodyPr rtlCol="0" anchor="ctr"/>
+              <a:lstStyle/>
+              <a:p>
+                <a:pPr algn="ctr"/>
+                <a:r>
+                  <a:rPr lang="en-SG" sz="2400" dirty="0">
+                    <a:solidFill>
+                      <a:schemeClr val="tx1"/>
+                    </a:solidFill>
+                  </a:rPr>
+                  <a:t>Noise Regime</a:t>
+                </a:r>
+              </a:p>
+            </p:txBody>
+          </p:sp>
+          <p:sp>
+            <p:nvSpPr>
+              <p:cNvPr id="25" name="Rectangle 24">
+                <a:extLst>
+                  <a:ext uri="{FF2B5EF4-FFF2-40B4-BE49-F238E27FC236}">
+                    <a16:creationId xmlns:a16="http://schemas.microsoft.com/office/drawing/2014/main" id="{F4015FE8-ACAD-47BA-8459-01CBCAA6F11F}"/>
+                  </a:ext>
+                </a:extLst>
+              </p:cNvPr>
+              <p:cNvSpPr/>
+              <p:nvPr/>
+            </p:nvSpPr>
+            <p:spPr>
+              <a:xfrm>
+                <a:off x="9692312" y="4187068"/>
+                <a:ext cx="2032001" cy="731521"/>
+              </a:xfrm>
+              <a:prstGeom prst="rect">
+                <a:avLst/>
+              </a:prstGeom>
+              <a:solidFill>
+                <a:schemeClr val="accent6">
+                  <a:lumMod val="20000"/>
+                  <a:lumOff val="80000"/>
+                </a:schemeClr>
+              </a:solidFill>
+              <a:ln>
+                <a:solidFill>
+                  <a:srgbClr val="000000"/>
+                </a:solidFill>
+              </a:ln>
+            </p:spPr>
+            <p:style>
+              <a:lnRef idx="2">
+                <a:schemeClr val="accent1">
+                  <a:shade val="50000"/>
+                </a:schemeClr>
+              </a:lnRef>
+              <a:fillRef idx="1">
+                <a:schemeClr val="accent1"/>
+              </a:fillRef>
+              <a:effectRef idx="0">
+                <a:schemeClr val="accent1"/>
+              </a:effectRef>
+              <a:fontRef idx="minor">
+                <a:schemeClr val="lt1"/>
+              </a:fontRef>
+            </p:style>
+            <p:txBody>
+              <a:bodyPr rtlCol="0" anchor="ctr"/>
+              <a:lstStyle/>
+              <a:p>
+                <a:pPr algn="ctr"/>
+                <a:r>
+                  <a:rPr lang="en-SG" sz="2400" dirty="0">
+                    <a:solidFill>
+                      <a:schemeClr val="tx1"/>
+                    </a:solidFill>
+                  </a:rPr>
+                  <a:t>Poor Linearity</a:t>
+                </a:r>
+              </a:p>
+            </p:txBody>
+          </p:sp>
+          <p:cxnSp>
+            <p:nvCxnSpPr>
+              <p:cNvPr id="26" name="Straight Arrow Connector 25">
+                <a:extLst>
+                  <a:ext uri="{FF2B5EF4-FFF2-40B4-BE49-F238E27FC236}">
+                    <a16:creationId xmlns:a16="http://schemas.microsoft.com/office/drawing/2014/main" id="{9034CF5A-8921-4C2D-A4C2-D7CDA1C78AF3}"/>
+                  </a:ext>
+                </a:extLst>
+              </p:cNvPr>
+              <p:cNvCxnSpPr>
+                <a:cxnSpLocks/>
+                <a:stCxn id="20" idx="3"/>
+                <a:endCxn id="21" idx="1"/>
+              </p:cNvCxnSpPr>
+              <p:nvPr/>
+            </p:nvCxnSpPr>
+            <p:spPr>
+              <a:xfrm>
+                <a:off x="5909708" y="2783572"/>
+                <a:ext cx="958753" cy="0"/>
+              </a:xfrm>
+              <a:prstGeom prst="straightConnector1">
+                <a:avLst/>
+              </a:prstGeom>
+              <a:ln w="38100">
+                <a:solidFill>
+                  <a:schemeClr val="accent6">
+                    <a:lumMod val="50000"/>
+                  </a:schemeClr>
+                </a:solidFill>
+                <a:tailEnd type="triangle"/>
+              </a:ln>
+            </p:spPr>
+            <p:style>
+              <a:lnRef idx="1">
+                <a:schemeClr val="accent1"/>
+              </a:lnRef>
+              <a:fillRef idx="0">
+                <a:schemeClr val="accent1"/>
+              </a:fillRef>
+              <a:effectRef idx="0">
+                <a:schemeClr val="accent1"/>
+              </a:effectRef>
+              <a:fontRef idx="minor">
+                <a:schemeClr val="tx1"/>
+              </a:fontRef>
+            </p:style>
+          </p:cxnSp>
+          <p:cxnSp>
+            <p:nvCxnSpPr>
+              <p:cNvPr id="27" name="Straight Arrow Connector 26">
+                <a:extLst>
+                  <a:ext uri="{FF2B5EF4-FFF2-40B4-BE49-F238E27FC236}">
+                    <a16:creationId xmlns:a16="http://schemas.microsoft.com/office/drawing/2014/main" id="{9A3BECA7-2930-4A0C-BB31-A658CF573918}"/>
+                  </a:ext>
+                </a:extLst>
+              </p:cNvPr>
+              <p:cNvCxnSpPr>
+                <a:cxnSpLocks/>
+                <a:stCxn id="19" idx="2"/>
+                <a:endCxn id="20" idx="0"/>
+              </p:cNvCxnSpPr>
+              <p:nvPr/>
+            </p:nvCxnSpPr>
+            <p:spPr>
+              <a:xfrm>
+                <a:off x="4616009" y="1427342"/>
+                <a:ext cx="1182" cy="927863"/>
+              </a:xfrm>
+              <a:prstGeom prst="straightConnector1">
+                <a:avLst/>
+              </a:prstGeom>
+              <a:ln w="38100">
+                <a:solidFill>
+                  <a:schemeClr val="accent6">
+                    <a:lumMod val="50000"/>
+                  </a:schemeClr>
+                </a:solidFill>
+                <a:tailEnd type="triangle"/>
+              </a:ln>
+            </p:spPr>
+            <p:style>
+              <a:lnRef idx="1">
+                <a:schemeClr val="accent1"/>
+              </a:lnRef>
+              <a:fillRef idx="0">
+                <a:schemeClr val="accent1"/>
+              </a:fillRef>
+              <a:effectRef idx="0">
+                <a:schemeClr val="accent1"/>
+              </a:effectRef>
+              <a:fontRef idx="minor">
+                <a:schemeClr val="tx1"/>
+              </a:fontRef>
+            </p:style>
+          </p:cxnSp>
+          <p:cxnSp>
+            <p:nvCxnSpPr>
+              <p:cNvPr id="28" name="Straight Arrow Connector 27">
+                <a:extLst>
+                  <a:ext uri="{FF2B5EF4-FFF2-40B4-BE49-F238E27FC236}">
+                    <a16:creationId xmlns:a16="http://schemas.microsoft.com/office/drawing/2014/main" id="{7E63EB9B-1F22-47A1-BDBF-908AA95C590D}"/>
+                  </a:ext>
+                </a:extLst>
+              </p:cNvPr>
+              <p:cNvCxnSpPr>
+                <a:cxnSpLocks/>
+                <a:stCxn id="19" idx="3"/>
+                <a:endCxn id="23" idx="1"/>
+              </p:cNvCxnSpPr>
+              <p:nvPr/>
+            </p:nvCxnSpPr>
+            <p:spPr>
+              <a:xfrm flipV="1">
+                <a:off x="5853146" y="1059811"/>
+                <a:ext cx="3848596" cy="1771"/>
+              </a:xfrm>
+              <a:prstGeom prst="straightConnector1">
+                <a:avLst/>
+              </a:prstGeom>
+              <a:ln w="38100">
+                <a:solidFill>
+                  <a:srgbClr val="99CC00"/>
+                </a:solidFill>
+                <a:tailEnd type="triangle"/>
+              </a:ln>
+            </p:spPr>
+            <p:style>
+              <a:lnRef idx="1">
+                <a:schemeClr val="accent1"/>
+              </a:lnRef>
+              <a:fillRef idx="0">
+                <a:schemeClr val="accent1"/>
+              </a:fillRef>
+              <a:effectRef idx="0">
+                <a:schemeClr val="accent1"/>
+              </a:effectRef>
+              <a:fontRef idx="minor">
+                <a:schemeClr val="tx1"/>
+              </a:fontRef>
+            </p:style>
+          </p:cxnSp>
+          <p:sp>
+            <p:nvSpPr>
+              <p:cNvPr id="29" name="TextBox 28">
+                <a:extLst>
+                  <a:ext uri="{FF2B5EF4-FFF2-40B4-BE49-F238E27FC236}">
+                    <a16:creationId xmlns:a16="http://schemas.microsoft.com/office/drawing/2014/main" id="{211C90F9-C041-4878-A720-286D0F6F08F0}"/>
+                  </a:ext>
+                </a:extLst>
+              </p:cNvPr>
+              <p:cNvSpPr txBox="1"/>
+              <p:nvPr/>
+            </p:nvSpPr>
+            <p:spPr>
+              <a:xfrm>
+                <a:off x="2449142" y="614688"/>
+                <a:ext cx="1036397" cy="461665"/>
+              </a:xfrm>
+              <a:prstGeom prst="rect">
+                <a:avLst/>
+              </a:prstGeom>
+              <a:noFill/>
+            </p:spPr>
+            <p:txBody>
+              <a:bodyPr wrap="square" rtlCol="0">
+                <a:spAutoFit/>
+              </a:bodyPr>
+              <a:lstStyle/>
+              <a:p>
+                <a:r>
+                  <a:rPr lang="en-SG" sz="2400" dirty="0"/>
+                  <a:t>&gt;= 0.8</a:t>
+                </a:r>
+              </a:p>
+            </p:txBody>
+          </p:sp>
+          <p:sp>
+            <p:nvSpPr>
+              <p:cNvPr id="30" name="TextBox 29">
+                <a:extLst>
+                  <a:ext uri="{FF2B5EF4-FFF2-40B4-BE49-F238E27FC236}">
+                    <a16:creationId xmlns:a16="http://schemas.microsoft.com/office/drawing/2014/main" id="{597998CC-4AEA-476F-81A8-E3311D8B887E}"/>
+                  </a:ext>
+                </a:extLst>
+              </p:cNvPr>
+              <p:cNvSpPr txBox="1"/>
+              <p:nvPr/>
+            </p:nvSpPr>
+            <p:spPr>
+              <a:xfrm>
+                <a:off x="1431635" y="1660440"/>
+                <a:ext cx="933104" cy="461665"/>
+              </a:xfrm>
+              <a:prstGeom prst="rect">
+                <a:avLst/>
+              </a:prstGeom>
+              <a:noFill/>
+            </p:spPr>
+            <p:txBody>
+              <a:bodyPr wrap="square" rtlCol="0">
+                <a:spAutoFit/>
+              </a:bodyPr>
+              <a:lstStyle/>
+              <a:p>
+                <a:r>
+                  <a:rPr lang="en-SG" sz="2400" dirty="0"/>
+                  <a:t>&lt; 0.8</a:t>
+                </a:r>
+              </a:p>
+            </p:txBody>
+          </p:sp>
+          <p:sp>
+            <p:nvSpPr>
+              <p:cNvPr id="31" name="TextBox 30">
+                <a:extLst>
+                  <a:ext uri="{FF2B5EF4-FFF2-40B4-BE49-F238E27FC236}">
+                    <a16:creationId xmlns:a16="http://schemas.microsoft.com/office/drawing/2014/main" id="{2B3478AC-77F5-4286-86D9-54230B203582}"/>
+                  </a:ext>
+                </a:extLst>
+              </p:cNvPr>
+              <p:cNvSpPr txBox="1"/>
+              <p:nvPr/>
+            </p:nvSpPr>
+            <p:spPr>
+              <a:xfrm>
+                <a:off x="7154752" y="598145"/>
+                <a:ext cx="1169016" cy="461665"/>
+              </a:xfrm>
+              <a:prstGeom prst="rect">
+                <a:avLst/>
+              </a:prstGeom>
+              <a:noFill/>
+            </p:spPr>
+            <p:txBody>
+              <a:bodyPr wrap="square" rtlCol="0">
+                <a:spAutoFit/>
+              </a:bodyPr>
+              <a:lstStyle/>
+              <a:p>
+                <a:r>
+                  <a:rPr lang="en-SG" sz="2400" dirty="0"/>
+                  <a:t>&gt;= 80%</a:t>
+                </a:r>
+              </a:p>
+            </p:txBody>
+          </p:sp>
+          <p:sp>
+            <p:nvSpPr>
+              <p:cNvPr id="32" name="TextBox 31">
+                <a:extLst>
+                  <a:ext uri="{FF2B5EF4-FFF2-40B4-BE49-F238E27FC236}">
+                    <a16:creationId xmlns:a16="http://schemas.microsoft.com/office/drawing/2014/main" id="{39996EB7-953D-4590-8E81-68B8B4BE1B44}"/>
+                  </a:ext>
+                </a:extLst>
+              </p:cNvPr>
+              <p:cNvSpPr txBox="1"/>
+              <p:nvPr/>
+            </p:nvSpPr>
+            <p:spPr>
+              <a:xfrm>
+                <a:off x="5893722" y="2761334"/>
+                <a:ext cx="963185" cy="461665"/>
+              </a:xfrm>
+              <a:prstGeom prst="rect">
+                <a:avLst/>
+              </a:prstGeom>
+              <a:noFill/>
+            </p:spPr>
+            <p:txBody>
+              <a:bodyPr wrap="square" rtlCol="0">
+                <a:spAutoFit/>
+              </a:bodyPr>
+              <a:lstStyle/>
+              <a:p>
+                <a:r>
+                  <a:rPr lang="en-SG" sz="2400" dirty="0"/>
+                  <a:t>&lt; 0.05</a:t>
+                </a:r>
+              </a:p>
+            </p:txBody>
+          </p:sp>
+          <p:sp>
+            <p:nvSpPr>
+              <p:cNvPr id="33" name="TextBox 32">
+                <a:extLst>
+                  <a:ext uri="{FF2B5EF4-FFF2-40B4-BE49-F238E27FC236}">
+                    <a16:creationId xmlns:a16="http://schemas.microsoft.com/office/drawing/2014/main" id="{0278EEC0-3C90-4166-891E-2634327A1EDB}"/>
+                  </a:ext>
+                </a:extLst>
+              </p:cNvPr>
+              <p:cNvSpPr txBox="1"/>
+              <p:nvPr/>
+            </p:nvSpPr>
+            <p:spPr>
+              <a:xfrm>
+                <a:off x="4755743" y="1615536"/>
+                <a:ext cx="963185" cy="461665"/>
+              </a:xfrm>
+              <a:prstGeom prst="rect">
+                <a:avLst/>
+              </a:prstGeom>
+              <a:noFill/>
+            </p:spPr>
+            <p:txBody>
+              <a:bodyPr wrap="square" rtlCol="0">
+                <a:spAutoFit/>
+              </a:bodyPr>
+              <a:lstStyle/>
+              <a:p>
+                <a:r>
+                  <a:rPr lang="en-SG" sz="2400" dirty="0"/>
+                  <a:t>&lt; 80%</a:t>
+                </a:r>
+              </a:p>
+            </p:txBody>
+          </p:sp>
+          <p:sp>
+            <p:nvSpPr>
+              <p:cNvPr id="34" name="TextBox 33">
+                <a:extLst>
+                  <a:ext uri="{FF2B5EF4-FFF2-40B4-BE49-F238E27FC236}">
+                    <a16:creationId xmlns:a16="http://schemas.microsoft.com/office/drawing/2014/main" id="{52DCE45D-DAA8-4844-BBF7-C7309E4B130B}"/>
+                  </a:ext>
+                </a:extLst>
+              </p:cNvPr>
+              <p:cNvSpPr txBox="1"/>
+              <p:nvPr/>
+            </p:nvSpPr>
+            <p:spPr>
+              <a:xfrm>
+                <a:off x="4630974" y="3566244"/>
+                <a:ext cx="1222172" cy="461665"/>
+              </a:xfrm>
+              <a:prstGeom prst="rect">
+                <a:avLst/>
+              </a:prstGeom>
+              <a:noFill/>
+            </p:spPr>
+            <p:txBody>
+              <a:bodyPr wrap="square" rtlCol="0">
+                <a:spAutoFit/>
+              </a:bodyPr>
+              <a:lstStyle/>
+              <a:p>
+                <a:r>
+                  <a:rPr lang="en-SG" sz="2400" dirty="0"/>
+                  <a:t>&gt;= 0.05</a:t>
+                </a:r>
+              </a:p>
+            </p:txBody>
+          </p:sp>
+          <p:sp>
+            <p:nvSpPr>
+              <p:cNvPr id="35" name="TextBox 34">
+                <a:extLst>
+                  <a:ext uri="{FF2B5EF4-FFF2-40B4-BE49-F238E27FC236}">
+                    <a16:creationId xmlns:a16="http://schemas.microsoft.com/office/drawing/2014/main" id="{B2025F16-CC59-4045-B8AA-7AAF14B9BC48}"/>
+                  </a:ext>
+                </a:extLst>
+              </p:cNvPr>
+              <p:cNvSpPr txBox="1"/>
+              <p:nvPr/>
+            </p:nvSpPr>
+            <p:spPr>
+              <a:xfrm>
+                <a:off x="8381077" y="3479574"/>
+                <a:ext cx="704479" cy="461665"/>
+              </a:xfrm>
+              <a:prstGeom prst="rect">
+                <a:avLst/>
+              </a:prstGeom>
+              <a:noFill/>
+            </p:spPr>
+            <p:txBody>
+              <a:bodyPr wrap="square" rtlCol="0">
+                <a:spAutoFit/>
+              </a:bodyPr>
+              <a:lstStyle/>
+              <a:p>
+                <a:r>
+                  <a:rPr lang="en-SG" sz="2400" dirty="0" err="1"/>
+                  <a:t>Pos</a:t>
+                </a:r>
+                <a:endParaRPr lang="en-SG" sz="2400" dirty="0"/>
+              </a:p>
+            </p:txBody>
+          </p:sp>
+          <p:sp>
+            <p:nvSpPr>
+              <p:cNvPr id="36" name="TextBox 35">
+                <a:extLst>
+                  <a:ext uri="{FF2B5EF4-FFF2-40B4-BE49-F238E27FC236}">
+                    <a16:creationId xmlns:a16="http://schemas.microsoft.com/office/drawing/2014/main" id="{94D1E9DD-A5F7-4F5D-8651-11E56D347D82}"/>
+                  </a:ext>
+                </a:extLst>
+              </p:cNvPr>
+              <p:cNvSpPr txBox="1"/>
+              <p:nvPr/>
+            </p:nvSpPr>
+            <p:spPr>
+              <a:xfrm>
+                <a:off x="8352698" y="1600103"/>
+                <a:ext cx="723333" cy="461665"/>
+              </a:xfrm>
+              <a:prstGeom prst="rect">
+                <a:avLst/>
+              </a:prstGeom>
+              <a:noFill/>
+            </p:spPr>
+            <p:txBody>
+              <a:bodyPr wrap="square" rtlCol="0">
+                <a:spAutoFit/>
+              </a:bodyPr>
+              <a:lstStyle/>
+              <a:p>
+                <a:pPr algn="ctr"/>
+                <a:r>
+                  <a:rPr lang="en-SG" sz="2400" dirty="0"/>
+                  <a:t>Neg</a:t>
+                </a:r>
+              </a:p>
+            </p:txBody>
+          </p:sp>
+          <p:cxnSp>
+            <p:nvCxnSpPr>
+              <p:cNvPr id="37" name="Connector: Elbow 36">
+                <a:extLst>
+                  <a:ext uri="{FF2B5EF4-FFF2-40B4-BE49-F238E27FC236}">
+                    <a16:creationId xmlns:a16="http://schemas.microsoft.com/office/drawing/2014/main" id="{09250787-EAD0-4B4E-AF03-E61488E35CE2}"/>
+                  </a:ext>
+                </a:extLst>
+              </p:cNvPr>
+              <p:cNvCxnSpPr>
+                <a:cxnSpLocks/>
+                <a:stCxn id="20" idx="2"/>
+                <a:endCxn id="25" idx="1"/>
+              </p:cNvCxnSpPr>
+              <p:nvPr/>
+            </p:nvCxnSpPr>
+            <p:spPr>
+              <a:xfrm rot="16200000" flipH="1">
+                <a:off x="6484306" y="1344822"/>
+                <a:ext cx="1340891" cy="5075121"/>
+              </a:xfrm>
+              <a:prstGeom prst="bentConnector2">
+                <a:avLst/>
+              </a:prstGeom>
+              <a:ln w="38100">
+                <a:solidFill>
+                  <a:srgbClr val="7030A0"/>
+                </a:solidFill>
+                <a:tailEnd type="triangle"/>
+              </a:ln>
+            </p:spPr>
+            <p:style>
+              <a:lnRef idx="1">
+                <a:schemeClr val="accent1"/>
+              </a:lnRef>
+              <a:fillRef idx="0">
+                <a:schemeClr val="accent1"/>
+              </a:fillRef>
+              <a:effectRef idx="0">
+                <a:schemeClr val="accent1"/>
+              </a:effectRef>
+              <a:fontRef idx="minor">
+                <a:schemeClr val="tx1"/>
+              </a:fontRef>
+            </p:style>
+          </p:cxnSp>
+          <p:cxnSp>
+            <p:nvCxnSpPr>
+              <p:cNvPr id="38" name="Connector: Elbow 37">
+                <a:extLst>
+                  <a:ext uri="{FF2B5EF4-FFF2-40B4-BE49-F238E27FC236}">
+                    <a16:creationId xmlns:a16="http://schemas.microsoft.com/office/drawing/2014/main" id="{5BEF1923-5DC3-4F0C-AFD5-03B6E6B453A3}"/>
+                  </a:ext>
+                </a:extLst>
+              </p:cNvPr>
+              <p:cNvCxnSpPr>
+                <a:cxnSpLocks/>
+                <a:stCxn id="39" idx="2"/>
+                <a:endCxn id="25" idx="1"/>
+              </p:cNvCxnSpPr>
+              <p:nvPr/>
+            </p:nvCxnSpPr>
+            <p:spPr>
+              <a:xfrm rot="16200000" flipH="1">
+                <a:off x="3970353" y="-1169131"/>
+                <a:ext cx="3122169" cy="8321750"/>
+              </a:xfrm>
+              <a:prstGeom prst="bentConnector2">
+                <a:avLst/>
+              </a:prstGeom>
+              <a:ln w="38100">
+                <a:solidFill>
+                  <a:srgbClr val="7030A0"/>
+                </a:solidFill>
+                <a:tailEnd type="triangle"/>
+              </a:ln>
+            </p:spPr>
+            <p:style>
+              <a:lnRef idx="1">
+                <a:schemeClr val="accent1"/>
+              </a:lnRef>
+              <a:fillRef idx="0">
+                <a:schemeClr val="accent1"/>
+              </a:fillRef>
+              <a:effectRef idx="0">
+                <a:schemeClr val="accent1"/>
+              </a:effectRef>
+              <a:fontRef idx="minor">
+                <a:schemeClr val="tx1"/>
+              </a:fontRef>
+            </p:style>
+          </p:cxnSp>
+          <p:sp>
+            <p:nvSpPr>
+              <p:cNvPr id="39" name="Rectangle 38">
+                <a:extLst>
+                  <a:ext uri="{FF2B5EF4-FFF2-40B4-BE49-F238E27FC236}">
+                    <a16:creationId xmlns:a16="http://schemas.microsoft.com/office/drawing/2014/main" id="{ED570DCA-CF59-4D8B-AB99-53DC8230208D}"/>
+                  </a:ext>
+                </a:extLst>
+              </p:cNvPr>
+              <p:cNvSpPr/>
+              <p:nvPr/>
+            </p:nvSpPr>
+            <p:spPr>
+              <a:xfrm>
+                <a:off x="354561" y="699139"/>
+                <a:ext cx="2032001" cy="731521"/>
+              </a:xfrm>
+              <a:prstGeom prst="rect">
+                <a:avLst/>
+              </a:prstGeom>
+              <a:solidFill>
+                <a:srgbClr val="CCFFFF"/>
+              </a:solidFill>
+              <a:ln>
+                <a:solidFill>
+                  <a:srgbClr val="000000"/>
+                </a:solidFill>
+              </a:ln>
+            </p:spPr>
+            <p:style>
+              <a:lnRef idx="2">
+                <a:schemeClr val="accent1">
+                  <a:shade val="50000"/>
+                </a:schemeClr>
+              </a:lnRef>
+              <a:fillRef idx="1">
+                <a:schemeClr val="accent1"/>
+              </a:fillRef>
+              <a:effectRef idx="0">
+                <a:schemeClr val="accent1"/>
+              </a:effectRef>
+              <a:fontRef idx="minor">
+                <a:schemeClr val="lt1"/>
+              </a:fontRef>
+            </p:style>
+            <p:txBody>
+              <a:bodyPr rtlCol="0" anchor="ctr"/>
+              <a:lstStyle/>
+              <a:p>
+                <a:pPr algn="ctr"/>
+                <a:r>
+                  <a:rPr lang="en-SG" sz="2400" dirty="0">
+                    <a:solidFill>
+                      <a:schemeClr val="tx1"/>
+                    </a:solidFill>
+                  </a:rPr>
+                  <a:t>Correlation Coefficient (R)</a:t>
+                </a:r>
+              </a:p>
+            </p:txBody>
+          </p:sp>
+          <p:cxnSp>
+            <p:nvCxnSpPr>
+              <p:cNvPr id="40" name="Connector: Elbow 39">
+                <a:extLst>
+                  <a:ext uri="{FF2B5EF4-FFF2-40B4-BE49-F238E27FC236}">
+                    <a16:creationId xmlns:a16="http://schemas.microsoft.com/office/drawing/2014/main" id="{E132AE54-0BC1-41F1-832F-6346AE4BD369}"/>
+                  </a:ext>
+                </a:extLst>
+              </p:cNvPr>
+              <p:cNvCxnSpPr>
+                <a:cxnSpLocks/>
+                <a:stCxn id="21" idx="0"/>
+                <a:endCxn id="22" idx="1"/>
+              </p:cNvCxnSpPr>
+              <p:nvPr/>
+            </p:nvCxnSpPr>
+            <p:spPr>
+              <a:xfrm rot="5400000" flipH="1" flipV="1">
+                <a:off x="8641643" y="1295106"/>
+                <a:ext cx="302919" cy="1817280"/>
+              </a:xfrm>
+              <a:prstGeom prst="bentConnector2">
+                <a:avLst/>
+              </a:prstGeom>
+              <a:ln w="38100">
+                <a:solidFill>
+                  <a:schemeClr val="accent6">
+                    <a:lumMod val="50000"/>
+                  </a:schemeClr>
+                </a:solidFill>
+                <a:tailEnd type="triangle"/>
+              </a:ln>
+            </p:spPr>
+            <p:style>
+              <a:lnRef idx="1">
+                <a:schemeClr val="accent1"/>
+              </a:lnRef>
+              <a:fillRef idx="0">
+                <a:schemeClr val="accent1"/>
+              </a:fillRef>
+              <a:effectRef idx="0">
+                <a:schemeClr val="accent1"/>
+              </a:effectRef>
+              <a:fontRef idx="minor">
+                <a:schemeClr val="tx1"/>
+              </a:fontRef>
+            </p:style>
+          </p:cxnSp>
+          <p:cxnSp>
+            <p:nvCxnSpPr>
+              <p:cNvPr id="41" name="Connector: Elbow 40">
+                <a:extLst>
+                  <a:ext uri="{FF2B5EF4-FFF2-40B4-BE49-F238E27FC236}">
+                    <a16:creationId xmlns:a16="http://schemas.microsoft.com/office/drawing/2014/main" id="{6CAA484A-79E0-434C-BA27-AFEE7783B2CD}"/>
+                  </a:ext>
+                </a:extLst>
+              </p:cNvPr>
+              <p:cNvCxnSpPr>
+                <a:cxnSpLocks/>
+                <a:stCxn id="21" idx="2"/>
+                <a:endCxn id="24" idx="1"/>
+              </p:cNvCxnSpPr>
+              <p:nvPr/>
+            </p:nvCxnSpPr>
+            <p:spPr>
+              <a:xfrm rot="16200000" flipH="1">
+                <a:off x="8629892" y="2466507"/>
+                <a:ext cx="316988" cy="1807848"/>
+              </a:xfrm>
+              <a:prstGeom prst="bentConnector2">
+                <a:avLst/>
+              </a:prstGeom>
+              <a:ln w="38100">
+                <a:solidFill>
+                  <a:schemeClr val="accent6">
+                    <a:lumMod val="50000"/>
+                  </a:schemeClr>
+                </a:solidFill>
+                <a:tailEnd type="triangle"/>
+              </a:ln>
+            </p:spPr>
+            <p:style>
+              <a:lnRef idx="1">
+                <a:schemeClr val="accent1"/>
+              </a:lnRef>
+              <a:fillRef idx="0">
+                <a:schemeClr val="accent1"/>
+              </a:fillRef>
+              <a:effectRef idx="0">
+                <a:schemeClr val="accent1"/>
+              </a:effectRef>
+              <a:fontRef idx="minor">
+                <a:schemeClr val="tx1"/>
+              </a:fontRef>
+            </p:style>
+          </p:cxnSp>
+        </p:grpSp>
+        <p:sp>
+          <p:nvSpPr>
+            <p:cNvPr id="57" name="Rectangle 56">
+              <a:extLst>
+                <a:ext uri="{FF2B5EF4-FFF2-40B4-BE49-F238E27FC236}">
+                  <a16:creationId xmlns:a16="http://schemas.microsoft.com/office/drawing/2014/main" id="{BA79DAB9-875B-4545-AE5F-F6E394D3EAAF}"/>
+                </a:ext>
+              </a:extLst>
+            </p:cNvPr>
+            <p:cNvSpPr/>
+            <p:nvPr/>
+          </p:nvSpPr>
+          <p:spPr>
+            <a:xfrm>
+              <a:off x="404668" y="-706139"/>
+              <a:ext cx="2090213" cy="584775"/>
+            </a:xfrm>
+            <a:prstGeom prst="rect">
+              <a:avLst/>
+            </a:prstGeom>
+          </p:spPr>
+          <p:txBody>
+            <a:bodyPr wrap="square">
+              <a:spAutoFit/>
+            </a:bodyPr>
+            <a:lstStyle/>
+            <a:p>
+              <a:r>
+                <a:rPr lang="en-SG" sz="3200" dirty="0"/>
+                <a:t>Workflow 1</a:t>
+              </a:r>
+            </a:p>
+          </p:txBody>
+        </p:sp>
+        <p:sp>
+          <p:nvSpPr>
+            <p:cNvPr id="58" name="Rectangle 57">
+              <a:extLst>
+                <a:ext uri="{FF2B5EF4-FFF2-40B4-BE49-F238E27FC236}">
+                  <a16:creationId xmlns:a16="http://schemas.microsoft.com/office/drawing/2014/main" id="{EA73D0B5-79F8-43E3-9ACE-E6B226507905}"/>
+                </a:ext>
+              </a:extLst>
+            </p:cNvPr>
+            <p:cNvSpPr/>
+            <p:nvPr/>
+          </p:nvSpPr>
+          <p:spPr>
+            <a:xfrm>
+              <a:off x="404668" y="1768346"/>
+              <a:ext cx="2090213" cy="584775"/>
+            </a:xfrm>
+            <a:prstGeom prst="rect">
+              <a:avLst/>
+            </a:prstGeom>
+          </p:spPr>
+          <p:txBody>
+            <a:bodyPr wrap="square">
+              <a:spAutoFit/>
+            </a:bodyPr>
+            <a:lstStyle/>
+            <a:p>
+              <a:r>
+                <a:rPr lang="en-SG" sz="3200" dirty="0"/>
+                <a:t>Workflow 2</a:t>
+              </a:r>
+            </a:p>
+          </p:txBody>
+        </p:sp>
+      </p:grpSp>
+    </p:spTree>
+    <p:extLst>
+      <p:ext uri="{BB962C8B-B14F-4D97-AF65-F5344CB8AC3E}">
+        <p14:creationId xmlns:p14="http://schemas.microsoft.com/office/powerpoint/2010/main" val="3374697378"/>
+      </p:ext>
+    </p:extLst>
+  </p:cSld>
+  <p:clrMapOvr>
+    <a:masterClrMapping/>
+  </p:clrMapOvr>
+</p:sld>
+</file>
+
 <file path=ppt/theme/theme1.xml><?xml version="1.0" encoding="utf-8"?>
 <a:theme xmlns:a="http://schemas.openxmlformats.org/drawingml/2006/main" name="Office Theme">
   <a:themeElements>

</xml_diff>

<commit_message>
Prepare for version 0.0.7
</commit_message>
<xml_diff>
--- a/Manuscript/For Manuscript.pptx
+++ b/Manuscript/For Manuscript.pptx
@@ -3361,10 +3361,10 @@
       </p:grpSpPr>
       <p:grpSp>
         <p:nvGrpSpPr>
-          <p:cNvPr id="13" name="Group 12">
+          <p:cNvPr id="15" name="Group 14">
             <a:extLst>
               <a:ext uri="{FF2B5EF4-FFF2-40B4-BE49-F238E27FC236}">
-                <a16:creationId xmlns:a16="http://schemas.microsoft.com/office/drawing/2014/main" id="{DB0DBFF1-FA6D-4BF3-A73A-F754FB19EBE1}"/>
+                <a16:creationId xmlns:a16="http://schemas.microsoft.com/office/drawing/2014/main" id="{89845FEE-7E1C-4F09-BFDD-B441FD05F9C3}"/>
               </a:ext>
             </a:extLst>
           </p:cNvPr>
@@ -3373,10 +3373,10 @@
         </p:nvGrpSpPr>
         <p:grpSpPr>
           <a:xfrm>
-            <a:off x="1602272" y="-193361"/>
-            <a:ext cx="9829800" cy="9619079"/>
-            <a:chOff x="1602272" y="-193361"/>
-            <a:chExt cx="9829800" cy="9619079"/>
+            <a:off x="1105548" y="165372"/>
+            <a:ext cx="10654652" cy="9260346"/>
+            <a:chOff x="1105548" y="165372"/>
+            <a:chExt cx="10654652" cy="9260346"/>
           </a:xfrm>
         </p:grpSpPr>
         <p:pic>
@@ -3401,8 +3401,8 @@
           </p:blipFill>
           <p:spPr>
             <a:xfrm>
-              <a:off x="1602272" y="-193361"/>
-              <a:ext cx="9829800" cy="2095500"/>
+              <a:off x="3239536" y="165372"/>
+              <a:ext cx="6555272" cy="1397442"/>
             </a:xfrm>
             <a:prstGeom prst="rect">
               <a:avLst/>
@@ -3423,8 +3423,8 @@
           </p:nvSpPr>
           <p:spPr>
             <a:xfrm>
-              <a:off x="1602272" y="1373448"/>
-              <a:ext cx="1504270" cy="378733"/>
+              <a:off x="3239536" y="1219200"/>
+              <a:ext cx="913364" cy="238126"/>
             </a:xfrm>
             <a:prstGeom prst="rect">
               <a:avLst/>
@@ -3479,8 +3479,8 @@
           </p:nvCxnSpPr>
           <p:spPr>
             <a:xfrm rot="16200000" flipH="1">
-              <a:off x="4028021" y="78566"/>
-              <a:ext cx="815537" cy="4162765"/>
+              <a:off x="4835947" y="317597"/>
+              <a:ext cx="457199" cy="2736656"/>
             </a:xfrm>
             <a:prstGeom prst="bentConnector3">
               <a:avLst>
@@ -3531,8 +3531,8 @@
           </p:blipFill>
           <p:spPr>
             <a:xfrm>
-              <a:off x="1715149" y="2567718"/>
-              <a:ext cx="9604046" cy="6858000"/>
+              <a:off x="1105548" y="1914525"/>
+              <a:ext cx="10654652" cy="7511193"/>
             </a:xfrm>
             <a:prstGeom prst="rect">
               <a:avLst/>

</xml_diff>